<commit_message>
vault credits and intro
</commit_message>
<xml_diff>
--- a/vault-consul/delivery/01__About_Vault_and_Consul_Class.pptx
+++ b/vault-consul/delivery/01__About_Vault_and_Consul_Class.pptx
@@ -1,8 +1,8 @@
 
 <file path=ppt/presentation.xml><?xml version="1.0" encoding="utf-8"?>
-<p:presentation xmlns:a="http://schemas.openxmlformats.org/drawingml/2006/main" xmlns:r="http://schemas.openxmlformats.org/officeDocument/2006/relationships" xmlns:p="http://schemas.openxmlformats.org/presentationml/2006/main" showSpecialPlsOnTitleSld="0" autoCompressPictures="0">
+<p:presentation xmlns:a="http://schemas.openxmlformats.org/drawingml/2006/main" xmlns:r="http://schemas.openxmlformats.org/officeDocument/2006/relationships" xmlns:p="http://schemas.openxmlformats.org/presentationml/2006/main" showSpecialPlsOnTitleSld="0" saveSubsetFonts="1" autoCompressPictures="0">
   <p:sldMasterIdLst>
-    <p:sldMasterId id="2147483648" r:id="rId1"/>
+    <p:sldMasterId id="2147483651" r:id="rId1"/>
   </p:sldMasterIdLst>
   <p:notesMasterIdLst>
     <p:notesMasterId r:id="rId15"/>
@@ -11,20 +11,21 @@
     <p:handoutMasterId r:id="rId16"/>
   </p:handoutMasterIdLst>
   <p:sldIdLst>
-    <p:sldId id="256" r:id="rId3"/>
-    <p:sldId id="257" r:id="rId4"/>
-    <p:sldId id="258" r:id="rId5"/>
-    <p:sldId id="259" r:id="rId6"/>
-    <p:sldId id="260" r:id="rId7"/>
-    <p:sldId id="261" r:id="rId8"/>
-    <p:sldId id="262" r:id="rId9"/>
-    <p:sldId id="263" r:id="rId10"/>
-    <p:sldId id="264" r:id="rId11"/>
-    <p:sldId id="265" r:id="rId12"/>
-    <p:sldId id="266" r:id="rId13"/>
-    <p:sldId id="267" r:id="rId14"/>
+    <p:sldId id="256" r:id="rId2"/>
+    <p:sldId id="257" r:id="rId3"/>
+    <p:sldId id="258" r:id="rId4"/>
+    <p:sldId id="259" r:id="rId5"/>
+    <p:sldId id="260" r:id="rId6"/>
+    <p:sldId id="261" r:id="rId7"/>
+    <p:sldId id="262" r:id="rId8"/>
+    <p:sldId id="263" r:id="rId9"/>
+    <p:sldId id="264" r:id="rId10"/>
+    <p:sldId id="265" r:id="rId11"/>
+    <p:sldId id="266" r:id="rId12"/>
+    <p:sldId id="267" r:id="rId13"/>
+    <p:sldId id="268" r:id="rId14"/>
   </p:sldIdLst>
-  <p:sldSz cx="9372600" cy="8297545"/>
+  <p:sldSz cx="9372600" cy="8297863"/>
   <p:notesSz cx="7315200" cy="9601200"/>
   <p:defaultTextStyle>
     <a:defPPr>
@@ -42,8 +43,8 @@
           <a:schemeClr val="tx1"/>
         </a:solidFill>
         <a:latin typeface="Garamond" pitchFamily="18" charset="0"/>
-        <a:ea typeface="MS PGothic"/>
-        <a:cs typeface="MS PGothic"/>
+        <a:ea typeface="ＭＳ Ｐゴシック"/>
+        <a:cs typeface="ＭＳ Ｐゴシック"/>
       </a:defRPr>
     </a:lvl1pPr>
     <a:lvl2pPr marL="457200" algn="l" rtl="0" fontAlgn="base">
@@ -58,8 +59,8 @@
           <a:schemeClr val="tx1"/>
         </a:solidFill>
         <a:latin typeface="Garamond" pitchFamily="18" charset="0"/>
-        <a:ea typeface="MS PGothic"/>
-        <a:cs typeface="MS PGothic"/>
+        <a:ea typeface="ＭＳ Ｐゴシック"/>
+        <a:cs typeface="ＭＳ Ｐゴシック"/>
       </a:defRPr>
     </a:lvl2pPr>
     <a:lvl3pPr marL="914400" algn="l" rtl="0" fontAlgn="base">
@@ -74,8 +75,8 @@
           <a:schemeClr val="tx1"/>
         </a:solidFill>
         <a:latin typeface="Garamond" pitchFamily="18" charset="0"/>
-        <a:ea typeface="MS PGothic"/>
-        <a:cs typeface="MS PGothic"/>
+        <a:ea typeface="ＭＳ Ｐゴシック"/>
+        <a:cs typeface="ＭＳ Ｐゴシック"/>
       </a:defRPr>
     </a:lvl3pPr>
     <a:lvl4pPr marL="1371600" algn="l" rtl="0" fontAlgn="base">
@@ -90,8 +91,8 @@
           <a:schemeClr val="tx1"/>
         </a:solidFill>
         <a:latin typeface="Garamond" pitchFamily="18" charset="0"/>
-        <a:ea typeface="MS PGothic"/>
-        <a:cs typeface="MS PGothic"/>
+        <a:ea typeface="ＭＳ Ｐゴシック"/>
+        <a:cs typeface="ＭＳ Ｐゴシック"/>
       </a:defRPr>
     </a:lvl4pPr>
     <a:lvl5pPr marL="1828800" algn="l" rtl="0" fontAlgn="base">
@@ -106,8 +107,8 @@
           <a:schemeClr val="tx1"/>
         </a:solidFill>
         <a:latin typeface="Garamond" pitchFamily="18" charset="0"/>
-        <a:ea typeface="MS PGothic"/>
-        <a:cs typeface="MS PGothic"/>
+        <a:ea typeface="ＭＳ Ｐゴシック"/>
+        <a:cs typeface="ＭＳ Ｐゴシック"/>
       </a:defRPr>
     </a:lvl5pPr>
     <a:lvl6pPr marL="2286000" algn="l" defTabSz="914400" rtl="0" eaLnBrk="1" latinLnBrk="0" hangingPunct="1">
@@ -116,8 +117,8 @@
           <a:schemeClr val="tx1"/>
         </a:solidFill>
         <a:latin typeface="Garamond" pitchFamily="18" charset="0"/>
-        <a:ea typeface="MS PGothic"/>
-        <a:cs typeface="MS PGothic"/>
+        <a:ea typeface="ＭＳ Ｐゴシック"/>
+        <a:cs typeface="ＭＳ Ｐゴシック"/>
       </a:defRPr>
     </a:lvl6pPr>
     <a:lvl7pPr marL="2743200" algn="l" defTabSz="914400" rtl="0" eaLnBrk="1" latinLnBrk="0" hangingPunct="1">
@@ -126,8 +127,8 @@
           <a:schemeClr val="tx1"/>
         </a:solidFill>
         <a:latin typeface="Garamond" pitchFamily="18" charset="0"/>
-        <a:ea typeface="MS PGothic"/>
-        <a:cs typeface="MS PGothic"/>
+        <a:ea typeface="ＭＳ Ｐゴシック"/>
+        <a:cs typeface="ＭＳ Ｐゴシック"/>
       </a:defRPr>
     </a:lvl7pPr>
     <a:lvl8pPr marL="3200400" algn="l" defTabSz="914400" rtl="0" eaLnBrk="1" latinLnBrk="0" hangingPunct="1">
@@ -136,8 +137,8 @@
           <a:schemeClr val="tx1"/>
         </a:solidFill>
         <a:latin typeface="Garamond" pitchFamily="18" charset="0"/>
-        <a:ea typeface="MS PGothic"/>
-        <a:cs typeface="MS PGothic"/>
+        <a:ea typeface="ＭＳ Ｐゴシック"/>
+        <a:cs typeface="ＭＳ Ｐゴシック"/>
       </a:defRPr>
     </a:lvl8pPr>
     <a:lvl9pPr marL="3657600" algn="l" defTabSz="914400" rtl="0" eaLnBrk="1" latinLnBrk="0" hangingPunct="1">
@@ -146,11 +147,41 @@
           <a:schemeClr val="tx1"/>
         </a:solidFill>
         <a:latin typeface="Garamond" pitchFamily="18" charset="0"/>
-        <a:ea typeface="MS PGothic"/>
-        <a:cs typeface="MS PGothic"/>
+        <a:ea typeface="ＭＳ Ｐゴシック"/>
+        <a:cs typeface="ＭＳ Ｐゴシック"/>
       </a:defRPr>
     </a:lvl9pPr>
   </p:defaultTextStyle>
+  <p:extLst>
+    <p:ext uri="{EFAFB233-063F-42B5-8137-9DF3F51BA10A}">
+      <p15:sldGuideLst xmlns:p15="http://schemas.microsoft.com/office/powerpoint/2012/main">
+        <p15:guide id="1" orient="horz" pos="2614" userDrawn="1">
+          <p15:clr>
+            <a:srgbClr val="A4A3A4"/>
+          </p15:clr>
+        </p15:guide>
+        <p15:guide id="2" pos="2952" userDrawn="1">
+          <p15:clr>
+            <a:srgbClr val="A4A3A4"/>
+          </p15:clr>
+        </p15:guide>
+      </p15:sldGuideLst>
+    </p:ext>
+    <p:ext uri="{2D200454-40CA-4A62-9FC3-DE9A4176ACB9}">
+      <p15:notesGuideLst xmlns:p15="http://schemas.microsoft.com/office/powerpoint/2012/main">
+        <p15:guide id="1" orient="horz" pos="3024">
+          <p15:clr>
+            <a:srgbClr val="A4A3A4"/>
+          </p15:clr>
+        </p15:guide>
+        <p15:guide id="2" pos="2308">
+          <p15:clr>
+            <a:srgbClr val="A4A3A4"/>
+          </p15:clr>
+        </p15:guide>
+      </p15:notesGuideLst>
+    </p:ext>
+  </p:extLst>
 </p:presentation>
 </file>
 
@@ -193,7 +224,7 @@
         <p:nvSpPr>
           <p:cNvPr id="1028" name="Rectangle 4"/>
           <p:cNvSpPr>
-            <a:spLocks noGrp="true" noChangeArrowheads="true"/>
+            <a:spLocks noGrp="1" noChangeArrowheads="1"/>
           </p:cNvSpPr>
           <p:nvPr>
             <p:ph type="ftr" sz="quarter" idx="2"/>
@@ -211,14 +242,20 @@
           <a:ln w="9525">
             <a:noFill/>
             <a:miter lim="800000"/>
+            <a:headEnd/>
+            <a:tailEnd/>
           </a:ln>
         </p:spPr>
         <p:txBody>
-          <a:bodyPr vert="horz" wrap="square" lIns="96603" tIns="48303" rIns="96603" bIns="48303" numCol="1" anchor="b" anchorCtr="false" compatLnSpc="true"/>
+          <a:bodyPr vert="horz" wrap="square" lIns="96603" tIns="48303" rIns="96603" bIns="48303" numCol="1" anchor="b" anchorCtr="0" compatLnSpc="1">
+            <a:prstTxWarp prst="textNoShape">
+              <a:avLst/>
+            </a:prstTxWarp>
+          </a:bodyPr>
           <a:lstStyle>
             <a:lvl1pPr defTabSz="965200">
               <a:defRPr sz="1200">
-                <a:latin typeface="Times New Roman" panose="02020603050405020304" charset="0"/>
+                <a:latin typeface="Times New Roman" pitchFamily="18" charset="0"/>
               </a:defRPr>
             </a:lvl1pPr>
           </a:lstStyle>
@@ -230,7 +267,6 @@
               <a:rPr lang="en-US" dirty="0"/>
               <a:t>Copyright © 2017 Elephant Scale. All rights reserved.</a:t>
             </a:r>
-            <a:endParaRPr lang="en-US" dirty="0"/>
           </a:p>
         </p:txBody>
       </p:sp>
@@ -238,7 +274,7 @@
         <p:nvSpPr>
           <p:cNvPr id="1029" name="Rectangle 5"/>
           <p:cNvSpPr>
-            <a:spLocks noGrp="true" noChangeArrowheads="true"/>
+            <a:spLocks noGrp="1" noChangeArrowheads="1"/>
           </p:cNvSpPr>
           <p:nvPr>
             <p:ph type="sldNum" sz="quarter" idx="3"/>
@@ -256,14 +292,20 @@
           <a:ln w="9525">
             <a:noFill/>
             <a:miter lim="800000"/>
+            <a:headEnd/>
+            <a:tailEnd/>
           </a:ln>
         </p:spPr>
         <p:txBody>
-          <a:bodyPr vert="horz" wrap="square" lIns="96603" tIns="48303" rIns="96603" bIns="48303" numCol="1" anchor="b" anchorCtr="false" compatLnSpc="true"/>
+          <a:bodyPr vert="horz" wrap="square" lIns="96603" tIns="48303" rIns="96603" bIns="48303" numCol="1" anchor="b" anchorCtr="0" compatLnSpc="1">
+            <a:prstTxWarp prst="textNoShape">
+              <a:avLst/>
+            </a:prstTxWarp>
+          </a:bodyPr>
           <a:lstStyle>
             <a:lvl1pPr algn="r" defTabSz="965200">
               <a:defRPr sz="1200">
-                <a:latin typeface="Times New Roman" panose="02020603050405020304" charset="0"/>
+                <a:latin typeface="Times New Roman" pitchFamily="18" charset="0"/>
               </a:defRPr>
             </a:lvl1pPr>
           </a:lstStyle>
@@ -273,12 +315,21 @@
             </a:pPr>
             <a:fld id="{97E62689-8C7D-4291-A094-4E689FEC4C3B}" type="slidenum">
               <a:rPr lang="en-US"/>
+              <a:pPr>
+                <a:defRPr/>
+              </a:pPr>
+              <a:t>‹#›</a:t>
             </a:fld>
             <a:endParaRPr lang="en-US" dirty="0"/>
           </a:p>
         </p:txBody>
       </p:sp>
     </p:spTree>
+    <p:extLst>
+      <p:ext uri="{BB962C8B-B14F-4D97-AF65-F5344CB8AC3E}">
+        <p14:creationId xmlns:p14="http://schemas.microsoft.com/office/powerpoint/2010/main" val="3239291525"/>
+      </p:ext>
+    </p:extLst>
   </p:cSld>
   <p:clrMap bg1="lt1" tx1="dk1" bg2="lt2" tx2="dk2" accent1="accent1" accent2="accent2" accent3="accent3" accent4="accent4" accent5="accent5" accent6="accent6" hlink="hlink" folHlink="folHlink"/>
   <p:hf hdr="0" ftr="0" dt="0"/>
@@ -314,7 +365,7 @@
         <p:nvSpPr>
           <p:cNvPr id="6146" name="Rectangle 4"/>
           <p:cNvSpPr>
-            <a:spLocks noGrp="true" noRot="true" noChangeAspect="true" noChangeArrowheads="true" noTextEdit="true"/>
+            <a:spLocks noGrp="1" noRot="1" noChangeAspect="1" noChangeArrowheads="1" noTextEdit="1"/>
           </p:cNvSpPr>
           <p:nvPr>
             <p:ph type="sldImg" idx="2"/>
@@ -334,6 +385,8 @@
               <a:srgbClr val="000000"/>
             </a:solidFill>
             <a:miter lim="800000"/>
+            <a:headEnd/>
+            <a:tailEnd/>
           </a:ln>
         </p:spPr>
       </p:sp>
@@ -341,7 +394,7 @@
         <p:nvSpPr>
           <p:cNvPr id="438280" name="Rectangle 8"/>
           <p:cNvSpPr>
-            <a:spLocks noGrp="true" noChangeArrowheads="true"/>
+            <a:spLocks noGrp="1" noChangeArrowheads="1"/>
           </p:cNvSpPr>
           <p:nvPr>
             <p:ph type="ftr" sz="quarter" idx="4"/>
@@ -359,15 +412,21 @@
           <a:ln w="9525">
             <a:noFill/>
             <a:miter lim="800000"/>
+            <a:headEnd/>
+            <a:tailEnd/>
           </a:ln>
           <a:effectLst/>
         </p:spPr>
         <p:txBody>
-          <a:bodyPr vert="horz" wrap="square" lIns="0" tIns="0" rIns="0" bIns="0" numCol="1" anchor="b" anchorCtr="true" compatLnSpc="true"/>
+          <a:bodyPr vert="horz" wrap="square" lIns="0" tIns="0" rIns="0" bIns="0" numCol="1" anchor="b" anchorCtr="1" compatLnSpc="1">
+            <a:prstTxWarp prst="textNoShape">
+              <a:avLst/>
+            </a:prstTxWarp>
+          </a:bodyPr>
           <a:lstStyle>
             <a:lvl1pPr algn="ctr" defTabSz="965200" eaLnBrk="0" hangingPunct="0">
               <a:defRPr sz="900">
-                <a:latin typeface="Arial" panose="020B0604020202020204" pitchFamily="34" charset="0"/>
+                <a:latin typeface="Arial" charset="0"/>
               </a:defRPr>
             </a:lvl1pPr>
           </a:lstStyle>
@@ -379,7 +438,6 @@
               <a:rPr lang="en-US" dirty="0"/>
               <a:t>Copyright © 2017 Elephant Scale. All rights reserved.</a:t>
             </a:r>
-            <a:endParaRPr lang="en-US" dirty="0"/>
           </a:p>
         </p:txBody>
       </p:sp>
@@ -387,7 +445,7 @@
         <p:nvSpPr>
           <p:cNvPr id="438281" name="Rectangle 9"/>
           <p:cNvSpPr>
-            <a:spLocks noGrp="true" noChangeArrowheads="true"/>
+            <a:spLocks noGrp="1" noChangeArrowheads="1"/>
           </p:cNvSpPr>
           <p:nvPr>
             <p:ph type="sldNum" sz="quarter" idx="5"/>
@@ -405,15 +463,21 @@
           <a:ln w="9525">
             <a:noFill/>
             <a:miter lim="800000"/>
+            <a:headEnd/>
+            <a:tailEnd/>
           </a:ln>
           <a:effectLst/>
         </p:spPr>
         <p:txBody>
-          <a:bodyPr vert="horz" wrap="square" lIns="0" tIns="0" rIns="0" bIns="0" numCol="1" anchor="b" anchorCtr="false" compatLnSpc="true"/>
+          <a:bodyPr vert="horz" wrap="square" lIns="0" tIns="0" rIns="0" bIns="0" numCol="1" anchor="b" anchorCtr="0" compatLnSpc="1">
+            <a:prstTxWarp prst="textNoShape">
+              <a:avLst/>
+            </a:prstTxWarp>
+          </a:bodyPr>
           <a:lstStyle>
             <a:lvl1pPr algn="r" defTabSz="965200" eaLnBrk="0" hangingPunct="0">
               <a:defRPr b="1">
-                <a:latin typeface="Arial" panose="020B0604020202020204" pitchFamily="34" charset="0"/>
+                <a:latin typeface="Arial" charset="0"/>
               </a:defRPr>
             </a:lvl1pPr>
           </a:lstStyle>
@@ -423,6 +487,10 @@
             </a:pPr>
             <a:fld id="{EFAADD5D-AF76-45EE-AA5F-6DAC73BF167A}" type="slidenum">
               <a:rPr lang="en-US"/>
+              <a:pPr>
+                <a:defRPr/>
+              </a:pPr>
+              <a:t>‹#›</a:t>
             </a:fld>
             <a:endParaRPr lang="en-US" dirty="0"/>
           </a:p>
@@ -431,8 +499,8 @@
       <p:sp>
         <p:nvSpPr>
           <p:cNvPr id="438306" name="Text Box 34"/>
-          <p:cNvSpPr txBox="true">
-            <a:spLocks noChangeArrowheads="true"/>
+          <p:cNvSpPr txBox="1">
+            <a:spLocks noChangeArrowheads="1"/>
           </p:cNvSpPr>
           <p:nvPr/>
         </p:nvSpPr>
@@ -448,26 +516,24 @@
           <a:ln w="9525">
             <a:noFill/>
             <a:miter lim="800000"/>
+            <a:headEnd/>
+            <a:tailEnd/>
           </a:ln>
         </p:spPr>
         <p:txBody>
           <a:bodyPr wrap="none" lIns="96386" tIns="48194" rIns="96386" bIns="48194"/>
           <a:lstStyle/>
           <a:p>
-            <a:pPr defTabSz="960755">
+            <a:pPr defTabSz="960438">
               <a:defRPr/>
             </a:pPr>
             <a:r>
               <a:rPr lang="en-US" sz="1200" b="1" u="sng" dirty="0">
-                <a:latin typeface="Times New Roman" panose="02020603050405020304" charset="0"/>
-                <a:cs typeface="Times New Roman" panose="02020603050405020304" charset="0"/>
+                <a:latin typeface="Times New Roman" pitchFamily="18" charset="0"/>
+                <a:cs typeface="Times New Roman" pitchFamily="18" charset="0"/>
               </a:rPr>
               <a:t>Notes:</a:t>
             </a:r>
-            <a:endParaRPr lang="en-US" sz="1200" b="1" u="sng" dirty="0">
-              <a:latin typeface="Times New Roman" panose="02020603050405020304" charset="0"/>
-              <a:cs typeface="Times New Roman" panose="02020603050405020304" charset="0"/>
-            </a:endParaRPr>
           </a:p>
         </p:txBody>
       </p:sp>
@@ -475,7 +541,7 @@
         <p:nvSpPr>
           <p:cNvPr id="438309" name="Rectangle 37"/>
           <p:cNvSpPr>
-            <a:spLocks noGrp="true" noChangeArrowheads="true"/>
+            <a:spLocks noGrp="1" noChangeArrowheads="1"/>
           </p:cNvSpPr>
           <p:nvPr>
             <p:ph type="body" sz="quarter" idx="3"/>
@@ -493,10 +559,16 @@
           <a:ln w="9525">
             <a:noFill/>
             <a:miter lim="800000"/>
+            <a:headEnd/>
+            <a:tailEnd/>
           </a:ln>
         </p:spPr>
         <p:txBody>
-          <a:bodyPr vert="horz" wrap="square" lIns="91537" tIns="45768" rIns="91537" bIns="45768" numCol="1" anchor="t" anchorCtr="false" compatLnSpc="true"/>
+          <a:bodyPr vert="horz" wrap="square" lIns="91537" tIns="45768" rIns="91537" bIns="45768" numCol="1" anchor="t" anchorCtr="0" compatLnSpc="1">
+            <a:prstTxWarp prst="textNoShape">
+              <a:avLst/>
+            </a:prstTxWarp>
+          </a:bodyPr>
           <a:lstStyle/>
           <a:p>
             <a:pPr lvl="0"/>
@@ -508,7 +580,7 @@
         <p:nvSpPr>
           <p:cNvPr id="438317" name="Line 45"/>
           <p:cNvSpPr>
-            <a:spLocks noChangeShapeType="true"/>
+            <a:spLocks noChangeShapeType="1"/>
           </p:cNvSpPr>
           <p:nvPr/>
         </p:nvSpPr>
@@ -526,6 +598,8 @@
               <a:srgbClr val="000000"/>
             </a:solidFill>
             <a:round/>
+            <a:headEnd/>
+            <a:tailEnd/>
           </a:ln>
           <a:effectLst/>
         </p:spPr>
@@ -540,7 +614,7 @@
               <a:defRPr/>
             </a:pPr>
             <a:endParaRPr lang="en-US" dirty="0">
-              <a:latin typeface="Garamond" pitchFamily="18" charset="0"/>
+              <a:latin typeface="Garamond" pitchFamily="-110" charset="0"/>
               <a:ea typeface="+mn-ea"/>
               <a:cs typeface="+mn-cs"/>
             </a:endParaRPr>
@@ -548,6 +622,11 @@
         </p:txBody>
       </p:sp>
     </p:spTree>
+    <p:extLst>
+      <p:ext uri="{BB962C8B-B14F-4D97-AF65-F5344CB8AC3E}">
+        <p14:creationId xmlns:p14="http://schemas.microsoft.com/office/powerpoint/2010/main" val="953744030"/>
+      </p:ext>
+    </p:extLst>
   </p:cSld>
   <p:clrMap bg1="lt1" tx1="dk1" bg2="lt2" tx2="dk2" accent1="accent1" accent2="accent2" accent3="accent3" accent4="accent4" accent5="accent5" accent6="accent6" hlink="hlink" folHlink="folHlink"/>
   <p:hf dt="0"/>
@@ -560,15 +639,15 @@
         <a:spcPct val="0"/>
       </a:spcAft>
       <a:buSzPct val="65000"/>
-      <a:buFont typeface="Wingdings" panose="05000000000000000000" pitchFamily="2" charset="2"/>
+      <a:buFont typeface="Wingdings" pitchFamily="2" charset="2"/>
       <a:buNone/>
       <a:defRPr sz="1200" kern="1200">
         <a:solidFill>
           <a:schemeClr val="tx1"/>
         </a:solidFill>
-        <a:latin typeface="Times New Roman" panose="02020603050405020304" charset="0"/>
-        <a:ea typeface="MS PGothic" pitchFamily="-110" charset="-128"/>
-        <a:cs typeface="MS PGothic" pitchFamily="-110" charset="-128"/>
+        <a:latin typeface="Times New Roman" pitchFamily="-110" charset="0"/>
+        <a:ea typeface="ＭＳ Ｐゴシック" pitchFamily="-110" charset="-128"/>
+        <a:cs typeface="ＭＳ Ｐゴシック" pitchFamily="-110" charset="-128"/>
       </a:defRPr>
     </a:lvl1pPr>
     <a:lvl2pPr marL="282575" indent="0" algn="l" rtl="0" eaLnBrk="0" fontAlgn="base" hangingPunct="0">
@@ -583,12 +662,12 @@
         <a:solidFill>
           <a:schemeClr val="tx1"/>
         </a:solidFill>
-        <a:latin typeface="Times New Roman" panose="02020603050405020304" charset="0"/>
-        <a:ea typeface="MS PGothic" pitchFamily="-110" charset="-128"/>
-        <a:cs typeface="MS PGothic"/>
+        <a:latin typeface="Times New Roman" pitchFamily="-110" charset="0"/>
+        <a:ea typeface="ＭＳ Ｐゴシック" pitchFamily="-110" charset="-128"/>
+        <a:cs typeface="ＭＳ Ｐゴシック"/>
       </a:defRPr>
     </a:lvl2pPr>
-    <a:lvl3pPr marL="744855" indent="-173355" algn="l" rtl="0" eaLnBrk="0" fontAlgn="base" hangingPunct="0">
+    <a:lvl3pPr marL="744538" indent="-173038" algn="l" rtl="0" eaLnBrk="0" fontAlgn="base" hangingPunct="0">
       <a:spcBef>
         <a:spcPct val="30000"/>
       </a:spcBef>
@@ -600,9 +679,9 @@
         <a:solidFill>
           <a:schemeClr val="tx1"/>
         </a:solidFill>
-        <a:latin typeface="Times New Roman" panose="02020603050405020304" charset="0"/>
-        <a:ea typeface="MS PGothic" pitchFamily="-110" charset="-128"/>
-        <a:cs typeface="MS PGothic"/>
+        <a:latin typeface="Times New Roman" pitchFamily="-110" charset="0"/>
+        <a:ea typeface="ＭＳ Ｐゴシック" pitchFamily="-110" charset="-128"/>
+        <a:cs typeface="ＭＳ Ｐゴシック"/>
       </a:defRPr>
     </a:lvl3pPr>
     <a:lvl4pPr marL="1600200" indent="-228600" algn="l" rtl="0" eaLnBrk="0" fontAlgn="base" hangingPunct="0">
@@ -616,9 +695,9 @@
         <a:solidFill>
           <a:schemeClr val="tx1"/>
         </a:solidFill>
-        <a:latin typeface="Times New Roman" panose="02020603050405020304" charset="0"/>
-        <a:ea typeface="MS PGothic" pitchFamily="-110" charset="-128"/>
-        <a:cs typeface="MS PGothic"/>
+        <a:latin typeface="Times New Roman" pitchFamily="-110" charset="0"/>
+        <a:ea typeface="ＭＳ Ｐゴシック" pitchFamily="-110" charset="-128"/>
+        <a:cs typeface="ＭＳ Ｐゴシック"/>
       </a:defRPr>
     </a:lvl4pPr>
     <a:lvl5pPr marL="2057400" indent="-228600" algn="l" rtl="0" eaLnBrk="0" fontAlgn="base" hangingPunct="0">
@@ -632,9 +711,9 @@
         <a:solidFill>
           <a:schemeClr val="tx1"/>
         </a:solidFill>
-        <a:latin typeface="Times New Roman" panose="02020603050405020304" charset="0"/>
-        <a:ea typeface="MS PGothic" pitchFamily="-110" charset="-128"/>
-        <a:cs typeface="MS PGothic"/>
+        <a:latin typeface="Times New Roman" pitchFamily="-110" charset="0"/>
+        <a:ea typeface="ＭＳ Ｐゴシック" pitchFamily="-110" charset="-128"/>
+        <a:cs typeface="ＭＳ Ｐゴシック"/>
       </a:defRPr>
     </a:lvl5pPr>
     <a:lvl6pPr marL="2286000" algn="l" defTabSz="457200" rtl="0" eaLnBrk="1" latinLnBrk="0" hangingPunct="1">
@@ -682,7 +761,7 @@
 </file>
 
 <file path=ppt/slideLayouts/slideLayout1.xml><?xml version="1.0" encoding="utf-8"?>
-<p:sldLayout xmlns:a="http://schemas.openxmlformats.org/drawingml/2006/main" xmlns:r="http://schemas.openxmlformats.org/officeDocument/2006/relationships" xmlns:p="http://schemas.openxmlformats.org/presentationml/2006/main" type="title" preserve="1" showMasterSp="0">
+<p:sldLayout xmlns:a="http://schemas.openxmlformats.org/drawingml/2006/main" xmlns:r="http://schemas.openxmlformats.org/officeDocument/2006/relationships" xmlns:p="http://schemas.openxmlformats.org/presentationml/2006/main" showMasterSp="0" type="title" preserve="1">
   <p:cSld name="Title Slide">
     <p:bg>
       <p:bgPr>
@@ -709,17 +788,15 @@
       <p:pic>
         <p:nvPicPr>
           <p:cNvPr id="4" name="Picture 7"/>
-          <p:cNvPicPr preferRelativeResize="false">
-            <a:picLocks noChangeArrowheads="true"/>
+          <p:cNvPicPr preferRelativeResize="0">
+            <a:picLocks noChangeArrowheads="1"/>
           </p:cNvPicPr>
           <p:nvPr/>
         </p:nvPicPr>
-        <p:blipFill rotWithShape="true">
+        <p:blipFill rotWithShape="1">
           <a:blip r:embed="rId2"/>
           <a:srcRect t="19473"/>
-          <a:stretch>
-            <a:fillRect/>
-          </a:stretch>
+          <a:stretch/>
         </p:blipFill>
         <p:spPr bwMode="auto">
           <a:xfrm>
@@ -742,7 +819,7 @@
         <p:nvSpPr>
           <p:cNvPr id="1104898" name="Rectangle 2"/>
           <p:cNvSpPr>
-            <a:spLocks noGrp="true" noChangeArrowheads="true"/>
+            <a:spLocks noGrp="1" noChangeArrowheads="1"/>
           </p:cNvSpPr>
           <p:nvPr>
             <p:ph type="subTitle" sz="quarter" idx="1"/>
@@ -770,7 +847,6 @@
               <a:rPr lang="en-US"/>
               <a:t>Click to edit Master subtitle style</a:t>
             </a:r>
-            <a:endParaRPr lang="en-US"/>
           </a:p>
         </p:txBody>
       </p:sp>
@@ -778,7 +854,7 @@
         <p:nvSpPr>
           <p:cNvPr id="1104900" name="Rectangle 4"/>
           <p:cNvSpPr>
-            <a:spLocks noGrp="true" noChangeArrowheads="true"/>
+            <a:spLocks noGrp="1" noChangeArrowheads="1"/>
           </p:cNvSpPr>
           <p:nvPr>
             <p:ph type="ctrTitle" sz="quarter"/>
@@ -802,7 +878,6 @@
               <a:rPr lang="en-US"/>
               <a:t>Click to edit Master title style</a:t>
             </a:r>
-            <a:endParaRPr lang="en-US"/>
           </a:p>
         </p:txBody>
       </p:sp>
@@ -835,7 +910,7 @@
         <p:nvSpPr>
           <p:cNvPr id="2" name="Title 1"/>
           <p:cNvSpPr>
-            <a:spLocks noGrp="true"/>
+            <a:spLocks noGrp="1"/>
           </p:cNvSpPr>
           <p:nvPr>
             <p:ph type="title"/>
@@ -852,7 +927,6 @@
               <a:rPr lang="en-US" dirty="0"/>
               <a:t>Click to edit Master title style</a:t>
             </a:r>
-            <a:endParaRPr lang="en-US" dirty="0"/>
           </a:p>
         </p:txBody>
       </p:sp>
@@ -860,7 +934,7 @@
         <p:nvSpPr>
           <p:cNvPr id="3" name="Content Placeholder 2"/>
           <p:cNvSpPr>
-            <a:spLocks noGrp="true"/>
+            <a:spLocks noGrp="1"/>
           </p:cNvSpPr>
           <p:nvPr>
             <p:ph idx="1"/>
@@ -876,7 +950,6 @@
               <a:rPr lang="en-US" dirty="0"/>
               <a:t>Click to edit Master text styles</a:t>
             </a:r>
-            <a:endParaRPr lang="en-US" dirty="0"/>
           </a:p>
           <a:p>
             <a:pPr lvl="1"/>
@@ -884,7 +957,6 @@
               <a:rPr lang="en-US" dirty="0"/>
               <a:t>Second level</a:t>
             </a:r>
-            <a:endParaRPr lang="en-US" dirty="0"/>
           </a:p>
           <a:p>
             <a:pPr lvl="2"/>
@@ -892,7 +964,6 @@
               <a:rPr lang="en-US" dirty="0"/>
               <a:t>Third level</a:t>
             </a:r>
-            <a:endParaRPr lang="en-US" dirty="0"/>
           </a:p>
           <a:p>
             <a:pPr lvl="3"/>
@@ -900,7 +971,6 @@
               <a:rPr lang="en-US" dirty="0"/>
               <a:t>Fourth level</a:t>
             </a:r>
-            <a:endParaRPr lang="en-US" dirty="0"/>
           </a:p>
           <a:p>
             <a:pPr lvl="4"/>
@@ -908,7 +978,6 @@
               <a:rPr lang="en-US" dirty="0"/>
               <a:t>Fifth level</a:t>
             </a:r>
-            <a:endParaRPr lang="en-US" dirty="0"/>
           </a:p>
         </p:txBody>
       </p:sp>
@@ -916,7 +985,7 @@
         <p:nvSpPr>
           <p:cNvPr id="8" name="Footer Placeholder 7"/>
           <p:cNvSpPr>
-            <a:spLocks noGrp="true"/>
+            <a:spLocks noGrp="1"/>
           </p:cNvSpPr>
           <p:nvPr>
             <p:ph type="ftr" sz="quarter" idx="11"/>
@@ -934,7 +1003,6 @@
               <a:rPr lang="en-US" dirty="0"/>
               <a:t>Copyright © 2017 Elephant Scale. All rights reserved.</a:t>
             </a:r>
-            <a:endParaRPr lang="en-US" dirty="0"/>
           </a:p>
         </p:txBody>
       </p:sp>
@@ -942,7 +1010,7 @@
         <p:nvSpPr>
           <p:cNvPr id="9" name="Slide Number Placeholder 8"/>
           <p:cNvSpPr>
-            <a:spLocks noGrp="true"/>
+            <a:spLocks noGrp="1"/>
           </p:cNvSpPr>
           <p:nvPr>
             <p:ph type="sldNum" sz="quarter" idx="12"/>
@@ -958,6 +1026,10 @@
             </a:pPr>
             <a:fld id="{77EF9825-4C23-4085-A4E3-B5565466BD91}" type="slidenum">
               <a:rPr lang="en-US" smtClean="0"/>
+              <a:pPr>
+                <a:defRPr/>
+              </a:pPr>
+              <a:t>‹#›</a:t>
             </a:fld>
             <a:endParaRPr lang="en-US" dirty="0"/>
           </a:p>
@@ -992,7 +1064,7 @@
         <p:nvSpPr>
           <p:cNvPr id="2" name="Title 1"/>
           <p:cNvSpPr>
-            <a:spLocks noGrp="true"/>
+            <a:spLocks noGrp="1"/>
           </p:cNvSpPr>
           <p:nvPr>
             <p:ph type="title"/>
@@ -1012,7 +1084,6 @@
               <a:rPr lang="en-US"/>
               <a:t>Click to edit Master title style</a:t>
             </a:r>
-            <a:endParaRPr lang="en-US"/>
           </a:p>
         </p:txBody>
       </p:sp>
@@ -1020,7 +1091,7 @@
         <p:nvSpPr>
           <p:cNvPr id="3" name="Text Placeholder 2"/>
           <p:cNvSpPr>
-            <a:spLocks noGrp="true"/>
+            <a:spLocks noGrp="1"/>
           </p:cNvSpPr>
           <p:nvPr>
             <p:ph type="body" sz="half" idx="1"/>
@@ -1041,7 +1112,6 @@
               <a:rPr lang="en-US"/>
               <a:t>Click to edit Master text styles</a:t>
             </a:r>
-            <a:endParaRPr lang="en-US"/>
           </a:p>
           <a:p>
             <a:pPr lvl="1"/>
@@ -1049,7 +1119,6 @@
               <a:rPr lang="en-US"/>
               <a:t>Second level</a:t>
             </a:r>
-            <a:endParaRPr lang="en-US"/>
           </a:p>
           <a:p>
             <a:pPr lvl="2"/>
@@ -1057,7 +1126,6 @@
               <a:rPr lang="en-US"/>
               <a:t>Third level</a:t>
             </a:r>
-            <a:endParaRPr lang="en-US"/>
           </a:p>
           <a:p>
             <a:pPr lvl="3"/>
@@ -1065,7 +1133,6 @@
               <a:rPr lang="en-US"/>
               <a:t>Fourth level</a:t>
             </a:r>
-            <a:endParaRPr lang="en-US"/>
           </a:p>
           <a:p>
             <a:pPr lvl="4"/>
@@ -1073,7 +1140,6 @@
               <a:rPr lang="en-US"/>
               <a:t>Fifth level</a:t>
             </a:r>
-            <a:endParaRPr lang="en-US"/>
           </a:p>
         </p:txBody>
       </p:sp>
@@ -1081,7 +1147,7 @@
         <p:nvSpPr>
           <p:cNvPr id="4" name="Content Placeholder 3"/>
           <p:cNvSpPr>
-            <a:spLocks noGrp="true"/>
+            <a:spLocks noGrp="1"/>
           </p:cNvSpPr>
           <p:nvPr>
             <p:ph sz="quarter" idx="2"/>
@@ -1102,7 +1168,6 @@
               <a:rPr lang="en-US"/>
               <a:t>Click to edit Master text styles</a:t>
             </a:r>
-            <a:endParaRPr lang="en-US"/>
           </a:p>
           <a:p>
             <a:pPr lvl="1"/>
@@ -1110,7 +1175,6 @@
               <a:rPr lang="en-US"/>
               <a:t>Second level</a:t>
             </a:r>
-            <a:endParaRPr lang="en-US"/>
           </a:p>
           <a:p>
             <a:pPr lvl="2"/>
@@ -1118,7 +1182,6 @@
               <a:rPr lang="en-US"/>
               <a:t>Third level</a:t>
             </a:r>
-            <a:endParaRPr lang="en-US"/>
           </a:p>
           <a:p>
             <a:pPr lvl="3"/>
@@ -1126,7 +1189,6 @@
               <a:rPr lang="en-US"/>
               <a:t>Fourth level</a:t>
             </a:r>
-            <a:endParaRPr lang="en-US"/>
           </a:p>
           <a:p>
             <a:pPr lvl="4"/>
@@ -1134,7 +1196,6 @@
               <a:rPr lang="en-US"/>
               <a:t>Fifth level</a:t>
             </a:r>
-            <a:endParaRPr lang="en-US"/>
           </a:p>
         </p:txBody>
       </p:sp>
@@ -1142,7 +1203,7 @@
         <p:nvSpPr>
           <p:cNvPr id="5" name="Content Placeholder 4"/>
           <p:cNvSpPr>
-            <a:spLocks noGrp="true"/>
+            <a:spLocks noGrp="1"/>
           </p:cNvSpPr>
           <p:nvPr>
             <p:ph sz="quarter" idx="3"/>
@@ -1163,7 +1224,6 @@
               <a:rPr lang="en-US"/>
               <a:t>Click to edit Master text styles</a:t>
             </a:r>
-            <a:endParaRPr lang="en-US"/>
           </a:p>
           <a:p>
             <a:pPr lvl="1"/>
@@ -1171,7 +1231,6 @@
               <a:rPr lang="en-US"/>
               <a:t>Second level</a:t>
             </a:r>
-            <a:endParaRPr lang="en-US"/>
           </a:p>
           <a:p>
             <a:pPr lvl="2"/>
@@ -1179,7 +1238,6 @@
               <a:rPr lang="en-US"/>
               <a:t>Third level</a:t>
             </a:r>
-            <a:endParaRPr lang="en-US"/>
           </a:p>
           <a:p>
             <a:pPr lvl="3"/>
@@ -1187,7 +1245,6 @@
               <a:rPr lang="en-US"/>
               <a:t>Fourth level</a:t>
             </a:r>
-            <a:endParaRPr lang="en-US"/>
           </a:p>
           <a:p>
             <a:pPr lvl="4"/>
@@ -1195,7 +1252,6 @@
               <a:rPr lang="en-US"/>
               <a:t>Fifth level</a:t>
             </a:r>
-            <a:endParaRPr lang="en-US"/>
           </a:p>
         </p:txBody>
       </p:sp>
@@ -1203,13 +1259,15 @@
         <p:nvSpPr>
           <p:cNvPr id="7" name="Rectangle 4"/>
           <p:cNvSpPr>
-            <a:spLocks noGrp="true" noChangeArrowheads="true"/>
+            <a:spLocks noGrp="1" noChangeArrowheads="1"/>
           </p:cNvSpPr>
           <p:nvPr>
             <p:ph type="sldNum" sz="quarter" idx="11"/>
           </p:nvPr>
         </p:nvSpPr>
-        <p:spPr/>
+        <p:spPr>
+          <a:ln/>
+        </p:spPr>
         <p:txBody>
           <a:bodyPr/>
           <a:lstStyle>
@@ -1223,6 +1281,10 @@
             </a:pPr>
             <a:fld id="{040E4B02-67B9-4228-B08B-2561CEE6B946}" type="slidenum">
               <a:rPr lang="en-US"/>
+              <a:pPr>
+                <a:defRPr/>
+              </a:pPr>
+              <a:t>‹#›</a:t>
             </a:fld>
             <a:endParaRPr lang="en-US" dirty="0"/>
           </a:p>
@@ -1232,13 +1294,15 @@
         <p:nvSpPr>
           <p:cNvPr id="8" name="Rectangle 5"/>
           <p:cNvSpPr>
-            <a:spLocks noGrp="true" noChangeArrowheads="true"/>
+            <a:spLocks noGrp="1" noChangeArrowheads="1"/>
           </p:cNvSpPr>
           <p:nvPr>
             <p:ph type="ftr" sz="quarter" idx="12"/>
           </p:nvPr>
         </p:nvSpPr>
-        <p:spPr/>
+        <p:spPr>
+          <a:ln/>
+        </p:spPr>
         <p:txBody>
           <a:bodyPr/>
           <a:lstStyle>
@@ -1254,7 +1318,6 @@
               <a:rPr lang="en-US" dirty="0"/>
               <a:t>Copyright © 2017 Elephant Scale. All rights reserved.</a:t>
             </a:r>
-            <a:endParaRPr lang="en-US" dirty="0"/>
           </a:p>
         </p:txBody>
       </p:sp>
@@ -1287,7 +1350,7 @@
         <p:nvSpPr>
           <p:cNvPr id="2" name="Title 1"/>
           <p:cNvSpPr>
-            <a:spLocks noGrp="true"/>
+            <a:spLocks noGrp="1"/>
           </p:cNvSpPr>
           <p:nvPr>
             <p:ph type="title"/>
@@ -1307,7 +1370,6 @@
               <a:rPr lang="en-US"/>
               <a:t>Click to edit Master title style</a:t>
             </a:r>
-            <a:endParaRPr lang="en-US"/>
           </a:p>
         </p:txBody>
       </p:sp>
@@ -1315,7 +1377,7 @@
         <p:nvSpPr>
           <p:cNvPr id="3" name="Text Placeholder 2"/>
           <p:cNvSpPr>
-            <a:spLocks noGrp="true"/>
+            <a:spLocks noGrp="1"/>
           </p:cNvSpPr>
           <p:nvPr>
             <p:ph type="body" sz="half" idx="1"/>
@@ -1336,7 +1398,6 @@
               <a:rPr lang="en-US"/>
               <a:t>Click to edit Master text styles</a:t>
             </a:r>
-            <a:endParaRPr lang="en-US"/>
           </a:p>
           <a:p>
             <a:pPr lvl="1"/>
@@ -1344,7 +1405,6 @@
               <a:rPr lang="en-US"/>
               <a:t>Second level</a:t>
             </a:r>
-            <a:endParaRPr lang="en-US"/>
           </a:p>
           <a:p>
             <a:pPr lvl="2"/>
@@ -1352,7 +1412,6 @@
               <a:rPr lang="en-US"/>
               <a:t>Third level</a:t>
             </a:r>
-            <a:endParaRPr lang="en-US"/>
           </a:p>
           <a:p>
             <a:pPr lvl="3"/>
@@ -1360,7 +1419,6 @@
               <a:rPr lang="en-US"/>
               <a:t>Fourth level</a:t>
             </a:r>
-            <a:endParaRPr lang="en-US"/>
           </a:p>
           <a:p>
             <a:pPr lvl="4"/>
@@ -1368,7 +1426,6 @@
               <a:rPr lang="en-US"/>
               <a:t>Fifth level</a:t>
             </a:r>
-            <a:endParaRPr lang="en-US"/>
           </a:p>
         </p:txBody>
       </p:sp>
@@ -1376,7 +1433,7 @@
         <p:nvSpPr>
           <p:cNvPr id="4" name="Content Placeholder 3"/>
           <p:cNvSpPr>
-            <a:spLocks noGrp="true"/>
+            <a:spLocks noGrp="1"/>
           </p:cNvSpPr>
           <p:nvPr>
             <p:ph sz="half" idx="2"/>
@@ -1397,7 +1454,6 @@
               <a:rPr lang="en-US"/>
               <a:t>Click to edit Master text styles</a:t>
             </a:r>
-            <a:endParaRPr lang="en-US"/>
           </a:p>
           <a:p>
             <a:pPr lvl="1"/>
@@ -1405,7 +1461,6 @@
               <a:rPr lang="en-US"/>
               <a:t>Second level</a:t>
             </a:r>
-            <a:endParaRPr lang="en-US"/>
           </a:p>
           <a:p>
             <a:pPr lvl="2"/>
@@ -1413,7 +1468,6 @@
               <a:rPr lang="en-US"/>
               <a:t>Third level</a:t>
             </a:r>
-            <a:endParaRPr lang="en-US"/>
           </a:p>
           <a:p>
             <a:pPr lvl="3"/>
@@ -1421,7 +1475,6 @@
               <a:rPr lang="en-US"/>
               <a:t>Fourth level</a:t>
             </a:r>
-            <a:endParaRPr lang="en-US"/>
           </a:p>
           <a:p>
             <a:pPr lvl="4"/>
@@ -1429,7 +1482,6 @@
               <a:rPr lang="en-US"/>
               <a:t>Fifth level</a:t>
             </a:r>
-            <a:endParaRPr lang="en-US"/>
           </a:p>
         </p:txBody>
       </p:sp>
@@ -1437,13 +1489,15 @@
         <p:nvSpPr>
           <p:cNvPr id="6" name="Rectangle 4"/>
           <p:cNvSpPr>
-            <a:spLocks noGrp="true" noChangeArrowheads="true"/>
+            <a:spLocks noGrp="1" noChangeArrowheads="1"/>
           </p:cNvSpPr>
           <p:nvPr>
             <p:ph type="sldNum" sz="quarter" idx="11"/>
           </p:nvPr>
         </p:nvSpPr>
-        <p:spPr/>
+        <p:spPr>
+          <a:ln/>
+        </p:spPr>
         <p:txBody>
           <a:bodyPr/>
           <a:lstStyle>
@@ -1457,6 +1511,10 @@
             </a:pPr>
             <a:fld id="{A86CC632-9864-46F1-8EAB-FCD3BB9CEC9A}" type="slidenum">
               <a:rPr lang="en-US"/>
+              <a:pPr>
+                <a:defRPr/>
+              </a:pPr>
+              <a:t>‹#›</a:t>
             </a:fld>
             <a:endParaRPr lang="en-US" dirty="0"/>
           </a:p>
@@ -1466,13 +1524,15 @@
         <p:nvSpPr>
           <p:cNvPr id="7" name="Rectangle 5"/>
           <p:cNvSpPr>
-            <a:spLocks noGrp="true" noChangeArrowheads="true"/>
+            <a:spLocks noGrp="1" noChangeArrowheads="1"/>
           </p:cNvSpPr>
           <p:nvPr>
             <p:ph type="ftr" sz="quarter" idx="12"/>
           </p:nvPr>
         </p:nvSpPr>
-        <p:spPr/>
+        <p:spPr>
+          <a:ln/>
+        </p:spPr>
         <p:txBody>
           <a:bodyPr/>
           <a:lstStyle>
@@ -1488,7 +1548,6 @@
               <a:rPr lang="en-US" dirty="0"/>
               <a:t>Copyright © 2017 Elephant Scale. All rights reserved.</a:t>
             </a:r>
-            <a:endParaRPr lang="en-US" dirty="0"/>
           </a:p>
         </p:txBody>
       </p:sp>
@@ -1529,7 +1588,7 @@
         <p:nvSpPr>
           <p:cNvPr id="1026" name="Rectangle 2"/>
           <p:cNvSpPr>
-            <a:spLocks noGrp="true" noChangeArrowheads="true"/>
+            <a:spLocks noGrp="1" noChangeArrowheads="1"/>
           </p:cNvSpPr>
           <p:nvPr>
             <p:ph type="body" idx="1"/>
@@ -1547,10 +1606,15 @@
           <a:ln w="9525">
             <a:noFill/>
             <a:miter lim="800000"/>
+            <a:headEnd/>
+            <a:tailEnd/>
           </a:ln>
         </p:spPr>
         <p:txBody>
-          <a:bodyPr vert="horz" wrap="square" lIns="92007" tIns="46005" rIns="92007" bIns="46005" numCol="1" anchor="t" anchorCtr="false" compatLnSpc="true">
+          <a:bodyPr vert="horz" wrap="square" lIns="92007" tIns="46005" rIns="92007" bIns="46005" numCol="1" anchor="t" anchorCtr="0" compatLnSpc="1">
+            <a:prstTxWarp prst="textNoShape">
+              <a:avLst/>
+            </a:prstTxWarp>
             <a:normAutofit/>
           </a:bodyPr>
           <a:lstStyle/>
@@ -1560,7 +1624,6 @@
               <a:rPr lang="en-US" dirty="0"/>
               <a:t>Click to edit Master text styles</a:t>
             </a:r>
-            <a:endParaRPr lang="en-US" dirty="0"/>
           </a:p>
           <a:p>
             <a:pPr lvl="1"/>
@@ -1568,7 +1631,6 @@
               <a:rPr lang="en-US" dirty="0"/>
               <a:t>Second level</a:t>
             </a:r>
-            <a:endParaRPr lang="en-US" dirty="0"/>
           </a:p>
           <a:p>
             <a:pPr lvl="2"/>
@@ -1576,7 +1638,6 @@
               <a:rPr lang="en-US" dirty="0"/>
               <a:t>Third level</a:t>
             </a:r>
-            <a:endParaRPr lang="en-US" dirty="0"/>
           </a:p>
           <a:p>
             <a:pPr lvl="3"/>
@@ -1584,7 +1645,6 @@
               <a:rPr lang="en-US" dirty="0"/>
               <a:t>Fourth level</a:t>
             </a:r>
-            <a:endParaRPr lang="en-US" dirty="0"/>
           </a:p>
           <a:p>
             <a:pPr lvl="4"/>
@@ -1592,7 +1652,6 @@
               <a:rPr lang="en-US" dirty="0"/>
               <a:t>Fifth level</a:t>
             </a:r>
-            <a:endParaRPr lang="en-US" dirty="0"/>
           </a:p>
         </p:txBody>
       </p:sp>
@@ -1600,7 +1659,7 @@
         <p:nvSpPr>
           <p:cNvPr id="1103876" name="Rectangle 4"/>
           <p:cNvSpPr>
-            <a:spLocks noGrp="true" noChangeArrowheads="true"/>
+            <a:spLocks noGrp="1" noChangeArrowheads="1"/>
           </p:cNvSpPr>
           <p:nvPr>
             <p:ph type="sldNum" sz="quarter" idx="4"/>
@@ -1618,20 +1677,26 @@
           <a:ln w="9525">
             <a:noFill/>
             <a:miter lim="800000"/>
+            <a:headEnd/>
+            <a:tailEnd/>
           </a:ln>
           <a:effectLst/>
         </p:spPr>
         <p:txBody>
-          <a:bodyPr vert="horz" wrap="square" lIns="0" tIns="0" rIns="0" bIns="0" numCol="1" anchor="b" anchorCtr="false" compatLnSpc="true"/>
+          <a:bodyPr vert="horz" wrap="square" lIns="0" tIns="0" rIns="0" bIns="0" numCol="1" anchor="b" anchorCtr="0" compatLnSpc="1">
+            <a:prstTxWarp prst="textNoShape">
+              <a:avLst/>
+            </a:prstTxWarp>
+          </a:bodyPr>
           <a:lstStyle>
             <a:lvl1pPr algn="r" eaLnBrk="0" hangingPunct="0">
               <a:defRPr b="1">
                 <a:solidFill>
                   <a:srgbClr val="000000"/>
                 </a:solidFill>
-                <a:latin typeface="Arial" panose="020B0604020202020204" pitchFamily="34" charset="0"/>
-                <a:ea typeface="MS PGothic" charset="0"/>
-                <a:cs typeface="MS PGothic" charset="0"/>
+                <a:latin typeface="Arial" charset="0"/>
+                <a:ea typeface="ＭＳ Ｐゴシック" charset="0"/>
+                <a:cs typeface="ＭＳ Ｐゴシック" charset="0"/>
               </a:defRPr>
             </a:lvl1pPr>
           </a:lstStyle>
@@ -1641,6 +1706,10 @@
             </a:pPr>
             <a:fld id="{77EF9825-4C23-4085-A4E3-B5565466BD91}" type="slidenum">
               <a:rPr lang="en-US"/>
+              <a:pPr>
+                <a:defRPr/>
+              </a:pPr>
+              <a:t>‹#›</a:t>
             </a:fld>
             <a:endParaRPr lang="en-US" dirty="0"/>
           </a:p>
@@ -1650,7 +1719,7 @@
         <p:nvSpPr>
           <p:cNvPr id="1103877" name="Rectangle 5"/>
           <p:cNvSpPr>
-            <a:spLocks noGrp="true" noChangeArrowheads="true"/>
+            <a:spLocks noGrp="1" noChangeArrowheads="1"/>
           </p:cNvSpPr>
           <p:nvPr>
             <p:ph type="ftr" sz="quarter" idx="3"/>
@@ -1668,11 +1737,16 @@
           <a:ln w="9525">
             <a:noFill/>
             <a:miter lim="800000"/>
+            <a:headEnd/>
+            <a:tailEnd/>
           </a:ln>
           <a:effectLst/>
         </p:spPr>
         <p:txBody>
-          <a:bodyPr vert="horz" wrap="square" lIns="0" tIns="0" rIns="0" bIns="0" numCol="1" anchor="t" anchorCtr="false" compatLnSpc="true">
+          <a:bodyPr vert="horz" wrap="square" lIns="0" tIns="0" rIns="0" bIns="0" numCol="1" anchor="t" anchorCtr="0" compatLnSpc="1">
+            <a:prstTxWarp prst="textNoShape">
+              <a:avLst/>
+            </a:prstTxWarp>
             <a:spAutoFit/>
           </a:bodyPr>
           <a:lstStyle>
@@ -1698,20 +1772,19 @@
               <a:rPr lang="en-US" dirty="0"/>
               <a:t>Copyright © 2017 Elephant Scale. All rights reserved.</a:t>
             </a:r>
-            <a:endParaRPr lang="en-US" dirty="0"/>
           </a:p>
         </p:txBody>
       </p:sp>
       <p:pic>
         <p:nvPicPr>
           <p:cNvPr id="1030" name="Picture 6"/>
-          <p:cNvPicPr preferRelativeResize="false">
-            <a:picLocks noChangeArrowheads="true"/>
+          <p:cNvPicPr preferRelativeResize="0">
+            <a:picLocks noChangeArrowheads="1"/>
           </p:cNvPicPr>
           <p:nvPr/>
         </p:nvPicPr>
         <p:blipFill>
-          <a:blip r:embed="rId5"/>
+          <a:blip r:embed="rId6"/>
           <a:srcRect/>
           <a:stretch>
             <a:fillRect/>
@@ -1738,7 +1811,7 @@
         <p:nvSpPr>
           <p:cNvPr id="1031" name="Rectangle 7"/>
           <p:cNvSpPr>
-            <a:spLocks noGrp="true" noChangeArrowheads="true"/>
+            <a:spLocks noGrp="1" noChangeArrowheads="1"/>
           </p:cNvSpPr>
           <p:nvPr>
             <p:ph type="title"/>
@@ -1758,10 +1831,16 @@
           <a:ln w="9525">
             <a:noFill/>
             <a:miter lim="800000"/>
+            <a:headEnd/>
+            <a:tailEnd/>
           </a:ln>
         </p:spPr>
         <p:txBody>
-          <a:bodyPr vert="horz" wrap="square" lIns="92007" tIns="46005" rIns="92007" bIns="46005" numCol="1" anchor="b" anchorCtr="false" compatLnSpc="true"/>
+          <a:bodyPr vert="horz" wrap="square" lIns="92007" tIns="46005" rIns="92007" bIns="46005" numCol="1" anchor="b" anchorCtr="0" compatLnSpc="1">
+            <a:prstTxWarp prst="textNoShape">
+              <a:avLst/>
+            </a:prstTxWarp>
+          </a:bodyPr>
           <a:lstStyle/>
           <a:p>
             <a:pPr lvl="0"/>
@@ -1769,7 +1848,6 @@
               <a:rPr lang="en-US" dirty="0"/>
               <a:t>Click to edit Master title style</a:t>
             </a:r>
-            <a:endParaRPr lang="en-US" dirty="0"/>
           </a:p>
         </p:txBody>
       </p:sp>
@@ -1777,10 +1855,10 @@
   </p:cSld>
   <p:clrMap bg1="dk2" tx1="lt1" bg2="dk1" tx2="lt2" accent1="accent1" accent2="accent2" accent3="accent3" accent4="accent4" accent5="accent5" accent6="accent6" hlink="hlink" folHlink="folHlink"/>
   <p:sldLayoutIdLst>
-    <p:sldLayoutId id="2147483649" r:id="rId1"/>
-    <p:sldLayoutId id="2147483650" r:id="rId2"/>
-    <p:sldLayoutId id="2147483651" r:id="rId3"/>
-    <p:sldLayoutId id="2147483652" r:id="rId4"/>
+    <p:sldLayoutId id="2147483656" r:id="rId1"/>
+    <p:sldLayoutId id="2147483655" r:id="rId2"/>
+    <p:sldLayoutId id="2147483654" r:id="rId3"/>
+    <p:sldLayoutId id="2147483653" r:id="rId4"/>
   </p:sldLayoutIdLst>
   <p:hf hdr="0" dt="0"/>
   <p:txStyles>
@@ -1797,8 +1875,8 @@
             <a:schemeClr val="tx1"/>
           </a:solidFill>
           <a:latin typeface="+mj-lt"/>
-          <a:ea typeface="MS PGothic" pitchFamily="-110" charset="-128"/>
-          <a:cs typeface="MS PGothic" pitchFamily="-110" charset="-128"/>
+          <a:ea typeface="ＭＳ Ｐゴシック" pitchFamily="-110" charset="-128"/>
+          <a:cs typeface="ＭＳ Ｐゴシック" pitchFamily="-110" charset="-128"/>
         </a:defRPr>
       </a:lvl1pPr>
       <a:lvl2pPr algn="l" rtl="0" eaLnBrk="0" fontAlgn="base" hangingPunct="0">
@@ -1812,9 +1890,9 @@
           <a:solidFill>
             <a:schemeClr val="tx1"/>
           </a:solidFill>
-          <a:latin typeface="Verdana" panose="020B0604030504040204" pitchFamily="-110" charset="0"/>
-          <a:ea typeface="MS PGothic" pitchFamily="-110" charset="-128"/>
-          <a:cs typeface="MS PGothic" pitchFamily="-110" charset="-128"/>
+          <a:latin typeface="Verdana" pitchFamily="-110" charset="0"/>
+          <a:ea typeface="ＭＳ Ｐゴシック" pitchFamily="-110" charset="-128"/>
+          <a:cs typeface="ＭＳ Ｐゴシック" pitchFamily="-110" charset="-128"/>
         </a:defRPr>
       </a:lvl2pPr>
       <a:lvl3pPr algn="l" rtl="0" eaLnBrk="0" fontAlgn="base" hangingPunct="0">
@@ -1828,9 +1906,9 @@
           <a:solidFill>
             <a:schemeClr val="tx1"/>
           </a:solidFill>
-          <a:latin typeface="Verdana" panose="020B0604030504040204" pitchFamily="-110" charset="0"/>
-          <a:ea typeface="MS PGothic" pitchFamily="-110" charset="-128"/>
-          <a:cs typeface="MS PGothic" pitchFamily="-110" charset="-128"/>
+          <a:latin typeface="Verdana" pitchFamily="-110" charset="0"/>
+          <a:ea typeface="ＭＳ Ｐゴシック" pitchFamily="-110" charset="-128"/>
+          <a:cs typeface="ＭＳ Ｐゴシック" pitchFamily="-110" charset="-128"/>
         </a:defRPr>
       </a:lvl3pPr>
       <a:lvl4pPr algn="l" rtl="0" eaLnBrk="0" fontAlgn="base" hangingPunct="0">
@@ -1844,9 +1922,9 @@
           <a:solidFill>
             <a:schemeClr val="tx1"/>
           </a:solidFill>
-          <a:latin typeface="Verdana" panose="020B0604030504040204" pitchFamily="-110" charset="0"/>
-          <a:ea typeface="MS PGothic" pitchFamily="-110" charset="-128"/>
-          <a:cs typeface="MS PGothic" pitchFamily="-110" charset="-128"/>
+          <a:latin typeface="Verdana" pitchFamily="-110" charset="0"/>
+          <a:ea typeface="ＭＳ Ｐゴシック" pitchFamily="-110" charset="-128"/>
+          <a:cs typeface="ＭＳ Ｐゴシック" pitchFamily="-110" charset="-128"/>
         </a:defRPr>
       </a:lvl4pPr>
       <a:lvl5pPr algn="l" rtl="0" eaLnBrk="0" fontAlgn="base" hangingPunct="0">
@@ -1860,9 +1938,9 @@
           <a:solidFill>
             <a:schemeClr val="tx1"/>
           </a:solidFill>
-          <a:latin typeface="Verdana" panose="020B0604030504040204" pitchFamily="-110" charset="0"/>
-          <a:ea typeface="MS PGothic" pitchFamily="-110" charset="-128"/>
-          <a:cs typeface="MS PGothic" pitchFamily="-110" charset="-128"/>
+          <a:latin typeface="Verdana" pitchFamily="-110" charset="0"/>
+          <a:ea typeface="ＭＳ Ｐゴシック" pitchFamily="-110" charset="-128"/>
+          <a:cs typeface="ＭＳ Ｐゴシック" pitchFamily="-110" charset="-128"/>
         </a:defRPr>
       </a:lvl5pPr>
       <a:lvl6pPr marL="457200" algn="l" rtl="0" eaLnBrk="0" fontAlgn="base" hangingPunct="0">
@@ -1876,7 +1954,7 @@
           <a:solidFill>
             <a:schemeClr val="tx1"/>
           </a:solidFill>
-          <a:latin typeface="Verdana" panose="020B0604030504040204" pitchFamily="-110" charset="0"/>
+          <a:latin typeface="Verdana" pitchFamily="-110" charset="0"/>
         </a:defRPr>
       </a:lvl6pPr>
       <a:lvl7pPr marL="914400" algn="l" rtl="0" eaLnBrk="0" fontAlgn="base" hangingPunct="0">
@@ -1890,7 +1968,7 @@
           <a:solidFill>
             <a:schemeClr val="tx1"/>
           </a:solidFill>
-          <a:latin typeface="Verdana" panose="020B0604030504040204" pitchFamily="-110" charset="0"/>
+          <a:latin typeface="Verdana" pitchFamily="-110" charset="0"/>
         </a:defRPr>
       </a:lvl7pPr>
       <a:lvl8pPr marL="1371600" algn="l" rtl="0" eaLnBrk="0" fontAlgn="base" hangingPunct="0">
@@ -1904,7 +1982,7 @@
           <a:solidFill>
             <a:schemeClr val="tx1"/>
           </a:solidFill>
-          <a:latin typeface="Verdana" panose="020B0604030504040204" pitchFamily="-110" charset="0"/>
+          <a:latin typeface="Verdana" pitchFamily="-110" charset="0"/>
         </a:defRPr>
       </a:lvl8pPr>
       <a:lvl9pPr marL="1828800" algn="l" rtl="0" eaLnBrk="0" fontAlgn="base" hangingPunct="0">
@@ -1918,12 +1996,12 @@
           <a:solidFill>
             <a:schemeClr val="tx1"/>
           </a:solidFill>
-          <a:latin typeface="Verdana" panose="020B0604030504040204" pitchFamily="-110" charset="0"/>
+          <a:latin typeface="Verdana" pitchFamily="-110" charset="0"/>
         </a:defRPr>
       </a:lvl9pPr>
     </p:titleStyle>
     <p:bodyStyle>
-      <a:lvl1pPr marL="290830" indent="-290830" algn="l" rtl="0" eaLnBrk="0" fontAlgn="base" hangingPunct="0">
+      <a:lvl1pPr marL="290513" indent="-290513" algn="l" rtl="0" eaLnBrk="0" fontAlgn="base" hangingPunct="0">
         <a:spcBef>
           <a:spcPct val="20000"/>
         </a:spcBef>
@@ -1934,18 +2012,18 @@
           <a:schemeClr val="tx2"/>
         </a:buClr>
         <a:buSzPct val="65000"/>
-        <a:buFont typeface="Wingdings" panose="05000000000000000000" pitchFamily="2" charset="2"/>
+        <a:buFont typeface="Wingdings" pitchFamily="2" charset="2"/>
         <a:buChar char=""/>
         <a:defRPr sz="2400">
           <a:solidFill>
             <a:srgbClr val="000000"/>
           </a:solidFill>
           <a:latin typeface="+mn-lt"/>
-          <a:ea typeface="MS PGothic" pitchFamily="-110" charset="-128"/>
-          <a:cs typeface="MS PGothic" pitchFamily="-110" charset="-128"/>
+          <a:ea typeface="ＭＳ Ｐゴシック" pitchFamily="-110" charset="-128"/>
+          <a:cs typeface="ＭＳ Ｐゴシック" pitchFamily="-110" charset="-128"/>
         </a:defRPr>
       </a:lvl1pPr>
-      <a:lvl2pPr marL="633730" indent="-228600" algn="l" rtl="0" eaLnBrk="0" fontAlgn="base" hangingPunct="0">
+      <a:lvl2pPr marL="633413" indent="-228600" algn="l" rtl="0" eaLnBrk="0" fontAlgn="base" hangingPunct="0">
         <a:spcBef>
           <a:spcPct val="20000"/>
         </a:spcBef>
@@ -1961,11 +2039,11 @@
             <a:srgbClr val="000000"/>
           </a:solidFill>
           <a:latin typeface="+mn-lt"/>
-          <a:ea typeface="MS PGothic" pitchFamily="-110" charset="-128"/>
-          <a:cs typeface="MS PGothic"/>
+          <a:ea typeface="ＭＳ Ｐゴシック" pitchFamily="-110" charset="-128"/>
+          <a:cs typeface="ＭＳ Ｐゴシック"/>
         </a:defRPr>
       </a:lvl2pPr>
-      <a:lvl3pPr marL="970280" indent="-222250" algn="l" rtl="0" eaLnBrk="0" fontAlgn="base" hangingPunct="0">
+      <a:lvl3pPr marL="969963" indent="-222250" algn="l" rtl="0" eaLnBrk="0" fontAlgn="base" hangingPunct="0">
         <a:spcBef>
           <a:spcPct val="20000"/>
         </a:spcBef>
@@ -1978,11 +2056,11 @@
             <a:srgbClr val="000000"/>
           </a:solidFill>
           <a:latin typeface="+mn-lt"/>
-          <a:ea typeface="MS PGothic" pitchFamily="-110" charset="-128"/>
-          <a:cs typeface="MS PGothic"/>
+          <a:ea typeface="ＭＳ Ｐゴシック" pitchFamily="-110" charset="-128"/>
+          <a:cs typeface="ＭＳ Ｐゴシック"/>
         </a:defRPr>
       </a:lvl3pPr>
-      <a:lvl4pPr marL="1259205" indent="-228600" algn="l" rtl="0" eaLnBrk="0" fontAlgn="base" hangingPunct="0">
+      <a:lvl4pPr marL="1258888" indent="-228600" algn="l" rtl="0" eaLnBrk="0" fontAlgn="base" hangingPunct="0">
         <a:spcBef>
           <a:spcPct val="0"/>
         </a:spcBef>
@@ -2000,11 +2078,11 @@
             <a:srgbClr val="000000"/>
           </a:solidFill>
           <a:latin typeface="+mn-lt"/>
-          <a:ea typeface="MS PGothic" pitchFamily="-110" charset="-128"/>
-          <a:cs typeface="MS PGothic"/>
+          <a:ea typeface="ＭＳ Ｐゴシック" pitchFamily="-110" charset="-128"/>
+          <a:cs typeface="ＭＳ Ｐゴシック"/>
         </a:defRPr>
       </a:lvl4pPr>
-      <a:lvl5pPr marL="2056130" indent="-230505" algn="l" rtl="0" eaLnBrk="0" fontAlgn="base" hangingPunct="0">
+      <a:lvl5pPr marL="2055813" indent="-230188" algn="l" rtl="0" eaLnBrk="0" fontAlgn="base" hangingPunct="0">
         <a:spcBef>
           <a:spcPct val="20000"/>
         </a:spcBef>
@@ -2018,12 +2096,12 @@
           <a:solidFill>
             <a:schemeClr val="tx1"/>
           </a:solidFill>
-          <a:latin typeface="Times New Roman" panose="02020603050405020304" charset="0"/>
-          <a:ea typeface="MS PGothic" pitchFamily="-110" charset="-128"/>
-          <a:cs typeface="MS PGothic"/>
+          <a:latin typeface="Times New Roman" pitchFamily="-110" charset="0"/>
+          <a:ea typeface="ＭＳ Ｐゴシック" pitchFamily="-110" charset="-128"/>
+          <a:cs typeface="ＭＳ Ｐゴシック"/>
         </a:defRPr>
       </a:lvl5pPr>
-      <a:lvl6pPr marL="2513330" indent="-230505" algn="l" rtl="0" eaLnBrk="0" fontAlgn="base" hangingPunct="0">
+      <a:lvl6pPr marL="2513013" indent="-230188" algn="l" rtl="0" eaLnBrk="0" fontAlgn="base" hangingPunct="0">
         <a:spcBef>
           <a:spcPct val="20000"/>
         </a:spcBef>
@@ -2037,11 +2115,11 @@
           <a:solidFill>
             <a:schemeClr val="tx1"/>
           </a:solidFill>
-          <a:latin typeface="Times New Roman" panose="02020603050405020304" charset="0"/>
-          <a:ea typeface="MS PGothic" pitchFamily="-110" charset="-128"/>
+          <a:latin typeface="Times New Roman" pitchFamily="-110" charset="0"/>
+          <a:ea typeface="ＭＳ Ｐゴシック" pitchFamily="-110" charset="-128"/>
         </a:defRPr>
       </a:lvl6pPr>
-      <a:lvl7pPr marL="2970530" indent="-230505" algn="l" rtl="0" eaLnBrk="0" fontAlgn="base" hangingPunct="0">
+      <a:lvl7pPr marL="2970213" indent="-230188" algn="l" rtl="0" eaLnBrk="0" fontAlgn="base" hangingPunct="0">
         <a:spcBef>
           <a:spcPct val="20000"/>
         </a:spcBef>
@@ -2055,11 +2133,11 @@
           <a:solidFill>
             <a:schemeClr val="tx1"/>
           </a:solidFill>
-          <a:latin typeface="Times New Roman" panose="02020603050405020304" charset="0"/>
-          <a:ea typeface="MS PGothic" pitchFamily="-110" charset="-128"/>
+          <a:latin typeface="Times New Roman" pitchFamily="-110" charset="0"/>
+          <a:ea typeface="ＭＳ Ｐゴシック" pitchFamily="-110" charset="-128"/>
         </a:defRPr>
       </a:lvl7pPr>
-      <a:lvl8pPr marL="3427730" indent="-230505" algn="l" rtl="0" eaLnBrk="0" fontAlgn="base" hangingPunct="0">
+      <a:lvl8pPr marL="3427413" indent="-230188" algn="l" rtl="0" eaLnBrk="0" fontAlgn="base" hangingPunct="0">
         <a:spcBef>
           <a:spcPct val="20000"/>
         </a:spcBef>
@@ -2073,11 +2151,11 @@
           <a:solidFill>
             <a:schemeClr val="tx1"/>
           </a:solidFill>
-          <a:latin typeface="Times New Roman" panose="02020603050405020304" charset="0"/>
-          <a:ea typeface="MS PGothic" pitchFamily="-110" charset="-128"/>
+          <a:latin typeface="Times New Roman" pitchFamily="-110" charset="0"/>
+          <a:ea typeface="ＭＳ Ｐゴシック" pitchFamily="-110" charset="-128"/>
         </a:defRPr>
       </a:lvl8pPr>
-      <a:lvl9pPr marL="3884930" indent="-230505" algn="l" rtl="0" eaLnBrk="0" fontAlgn="base" hangingPunct="0">
+      <a:lvl9pPr marL="3884613" indent="-230188" algn="l" rtl="0" eaLnBrk="0" fontAlgn="base" hangingPunct="0">
         <a:spcBef>
           <a:spcPct val="20000"/>
         </a:spcBef>
@@ -2091,8 +2169,8 @@
           <a:solidFill>
             <a:schemeClr val="tx1"/>
           </a:solidFill>
-          <a:latin typeface="Times New Roman" panose="02020603050405020304" charset="0"/>
-          <a:ea typeface="MS PGothic" pitchFamily="-110" charset="-128"/>
+          <a:latin typeface="Times New Roman" pitchFamily="-110" charset="0"/>
+          <a:ea typeface="ＭＳ Ｐゴシック" pitchFamily="-110" charset="-128"/>
         </a:defRPr>
       </a:lvl9pPr>
     </p:bodyStyle>
@@ -2204,12 +2282,19 @@
         <p:cNvGrpSpPr/>
         <p:nvPr/>
       </p:nvGrpSpPr>
-      <p:grpSpPr/>
+      <p:grpSpPr>
+        <a:xfrm>
+          <a:off x="0" y="0"/>
+          <a:ext cx="0" cy="0"/>
+          <a:chOff x="0" y="0"/>
+          <a:chExt cx="0" cy="0"/>
+        </a:xfrm>
+      </p:grpSpPr>
       <p:sp>
         <p:nvSpPr>
           <p:cNvPr id="2" name="Subtitle 1"/>
           <p:cNvSpPr>
-            <a:spLocks noGrp="true"/>
+            <a:spLocks noGrp="1"/>
           </p:cNvSpPr>
           <p:nvPr>
             <p:ph type="subTitle" sz="quarter" idx="1"/>
@@ -2219,14 +2304,16 @@
         <p:txBody>
           <a:bodyPr/>
           <a:lstStyle/>
-          <a:p/>
+          <a:p>
+            <a:endParaRPr/>
+          </a:p>
         </p:txBody>
       </p:sp>
       <p:sp>
         <p:nvSpPr>
           <p:cNvPr id="3" name="Title 2"/>
           <p:cNvSpPr>
-            <a:spLocks noGrp="true"/>
+            <a:spLocks noGrp="1"/>
           </p:cNvSpPr>
           <p:nvPr>
             <p:ph type="ctrTitle" sz="quarter"/>
@@ -2249,7 +2336,7 @@
       <p:sp>
         <p:nvSpPr>
           <p:cNvPr id="4" name="TextBox 3"/>
-          <p:cNvSpPr txBox="true"/>
+          <p:cNvSpPr txBox="1"/>
           <p:nvPr/>
         </p:nvSpPr>
         <p:spPr>
@@ -2276,11 +2363,6 @@
               </a:rPr>
               <a:t>Copyright © 2021 by Elephant Scale, All Rights Reserved</a:t>
             </a:r>
-            <a:endParaRPr sz="800">
-              <a:solidFill>
-                <a:srgbClr val="000000"/>
-              </a:solidFill>
-            </a:endParaRPr>
           </a:p>
         </p:txBody>
       </p:sp>
@@ -2301,12 +2383,19 @@
         <p:cNvGrpSpPr/>
         <p:nvPr/>
       </p:nvGrpSpPr>
-      <p:grpSpPr/>
+      <p:grpSpPr>
+        <a:xfrm>
+          <a:off x="0" y="0"/>
+          <a:ext cx="0" cy="0"/>
+          <a:chOff x="0" y="0"/>
+          <a:chExt cx="0" cy="0"/>
+        </a:xfrm>
+      </p:grpSpPr>
       <p:sp>
         <p:nvSpPr>
           <p:cNvPr id="2" name="Title 1"/>
           <p:cNvSpPr>
-            <a:spLocks noGrp="true"/>
+            <a:spLocks noGrp="1"/>
           </p:cNvSpPr>
           <p:nvPr>
             <p:ph type="title"/>
@@ -2327,7 +2416,7 @@
         <p:nvSpPr>
           <p:cNvPr id="3" name="Content Placeholder 2"/>
           <p:cNvSpPr>
-            <a:spLocks noGrp="true"/>
+            <a:spLocks noGrp="1"/>
           </p:cNvSpPr>
           <p:nvPr>
             <p:ph idx="1"/>
@@ -2386,7 +2475,7 @@
       <p:sp>
         <p:nvSpPr>
           <p:cNvPr id="4" name="TextBox 3"/>
-          <p:cNvSpPr txBox="true"/>
+          <p:cNvSpPr txBox="1"/>
           <p:nvPr/>
         </p:nvSpPr>
         <p:spPr>
@@ -2413,11 +2502,6 @@
               </a:rPr>
               <a:t>Copyright © 2021 by Elephant Scale, All Rights Reserved</a:t>
             </a:r>
-            <a:endParaRPr sz="800">
-              <a:solidFill>
-                <a:srgbClr val="000000"/>
-              </a:solidFill>
-            </a:endParaRPr>
           </a:p>
         </p:txBody>
       </p:sp>
@@ -2438,12 +2522,19 @@
         <p:cNvGrpSpPr/>
         <p:nvPr/>
       </p:nvGrpSpPr>
-      <p:grpSpPr/>
+      <p:grpSpPr>
+        <a:xfrm>
+          <a:off x="0" y="0"/>
+          <a:ext cx="0" cy="0"/>
+          <a:chOff x="0" y="0"/>
+          <a:chExt cx="0" cy="0"/>
+        </a:xfrm>
+      </p:grpSpPr>
       <p:sp>
         <p:nvSpPr>
           <p:cNvPr id="2" name="Title 1"/>
           <p:cNvSpPr>
-            <a:spLocks noGrp="true"/>
+            <a:spLocks noGrp="1"/>
           </p:cNvSpPr>
           <p:nvPr>
             <p:ph type="title"/>
@@ -2464,7 +2555,7 @@
         <p:nvSpPr>
           <p:cNvPr id="3" name="Content Placeholder 2"/>
           <p:cNvSpPr>
-            <a:spLocks noGrp="true"/>
+            <a:spLocks noGrp="1"/>
           </p:cNvSpPr>
           <p:nvPr>
             <p:ph idx="1"/>
@@ -2511,13 +2602,10 @@
             </a:r>
             <a:r>
               <a:rPr>
-                <a:latin typeface="Courier New" panose="02070309020205020404"/>
+                <a:latin typeface="Courier New"/>
               </a:rPr>
               <a:t> Catalog.scala</a:t>
             </a:r>
-            <a:endParaRPr>
-              <a:latin typeface="Courier New" panose="02070309020205020404"/>
-            </a:endParaRPr>
           </a:p>
           <a:p>
             <a:pPr lvl="1"/>
@@ -2525,15 +2613,21 @@
               <a:t> Longer code examples appear in a separate code box:</a:t>
             </a:r>
           </a:p>
-          <a:p/>
-          <a:p/>
-          <a:p/>
+          <a:p>
+            <a:endParaRPr/>
+          </a:p>
+          <a:p>
+            <a:endParaRPr/>
+          </a:p>
+          <a:p>
+            <a:endParaRPr/>
+          </a:p>
         </p:txBody>
       </p:sp>
       <p:sp>
         <p:nvSpPr>
           <p:cNvPr id="4" name="TextBox 3"/>
-          <p:cNvSpPr txBox="true"/>
+          <p:cNvSpPr txBox="1"/>
           <p:nvPr/>
         </p:nvSpPr>
         <p:spPr>
@@ -2560,11 +2654,6 @@
               </a:rPr>
               <a:t>Copyright © 2021 by Elephant Scale, All Rights Reserved</a:t>
             </a:r>
-            <a:endParaRPr sz="800">
-              <a:solidFill>
-                <a:srgbClr val="000000"/>
-              </a:solidFill>
-            </a:endParaRPr>
           </a:p>
         </p:txBody>
       </p:sp>
@@ -2572,12 +2661,12 @@
         <p:nvPicPr>
           <p:cNvPr id="5" name="Picture 4" descr="1.png"/>
           <p:cNvPicPr>
-            <a:picLocks noChangeAspect="true"/>
+            <a:picLocks noChangeAspect="1"/>
           </p:cNvPicPr>
           <p:nvPr/>
         </p:nvPicPr>
         <p:blipFill>
-          <a:blip r:embed="rId1"/>
+          <a:blip r:embed="rId2"/>
           <a:stretch>
             <a:fillRect/>
           </a:stretch>
@@ -2609,12 +2698,19 @@
         <p:cNvGrpSpPr/>
         <p:nvPr/>
       </p:nvGrpSpPr>
-      <p:grpSpPr/>
+      <p:grpSpPr>
+        <a:xfrm>
+          <a:off x="0" y="0"/>
+          <a:ext cx="0" cy="0"/>
+          <a:chOff x="0" y="0"/>
+          <a:chExt cx="0" cy="0"/>
+        </a:xfrm>
+      </p:grpSpPr>
       <p:sp>
         <p:nvSpPr>
           <p:cNvPr id="2" name="Title 1"/>
           <p:cNvSpPr>
-            <a:spLocks noGrp="true"/>
+            <a:spLocks noGrp="1"/>
           </p:cNvSpPr>
           <p:nvPr>
             <p:ph type="title"/>
@@ -2626,7 +2722,7 @@
           <a:lstStyle/>
           <a:p>
             <a:r>
-              <a:t>Questions?</a:t>
+              <a:t>Recommended books and credits</a:t>
             </a:r>
           </a:p>
         </p:txBody>
@@ -2635,7 +2731,7 @@
         <p:nvSpPr>
           <p:cNvPr id="3" name="Content Placeholder 2"/>
           <p:cNvSpPr>
-            <a:spLocks noGrp="true"/>
+            <a:spLocks noGrp="1"/>
           </p:cNvSpPr>
           <p:nvPr>
             <p:ph idx="1"/>
@@ -2647,15 +2743,75 @@
           <a:lstStyle/>
           <a:p>
             <a:r>
-              <a:t> Any questions?</a:t>
-            </a:r>
+              <a:t> Bryan Krausen book on Amazon:</a:t>
+            </a:r>
+            <a:r>
+              <a:rPr>
+                <a:hlinkClick r:id="rId2"/>
+              </a:rPr>
+              <a:t> Running HashiCorp Vault in Production</a:t>
+            </a:r>
+          </a:p>
+          <a:p>
+            <a:r>
+              <a:t> Bryan Krausen book on Gumroad in PDF format:</a:t>
+            </a:r>
+            <a:r>
+              <a:rPr>
+                <a:hlinkClick r:id="rId3"/>
+              </a:rPr>
+              <a:t> Running HashiCorp Vault in Production</a:t>
+            </a:r>
+          </a:p>
+          <a:p>
+            <a:r>
+              <a:rPr>
+                <a:hlinkClick r:id="rId4"/>
+              </a:rPr>
+              <a:t> Udemy Profile for Bryan Krausen</a:t>
+            </a:r>
+          </a:p>
+          <a:p>
+            <a:endParaRPr>
+              <a:hlinkClick r:id="rId4"/>
+            </a:endParaRPr>
+          </a:p>
+          <a:p>
+            <a:endParaRPr>
+              <a:hlinkClick r:id="rId4"/>
+            </a:endParaRPr>
+          </a:p>
+          <a:p>
+            <a:endParaRPr>
+              <a:hlinkClick r:id="rId4"/>
+            </a:endParaRPr>
+          </a:p>
+          <a:p>
+            <a:endParaRPr>
+              <a:hlinkClick r:id="rId4"/>
+            </a:endParaRPr>
+          </a:p>
+          <a:p>
+            <a:endParaRPr>
+              <a:hlinkClick r:id="rId4"/>
+            </a:endParaRPr>
+          </a:p>
+          <a:p>
+            <a:endParaRPr>
+              <a:hlinkClick r:id="rId4"/>
+            </a:endParaRPr>
+          </a:p>
+          <a:p>
+            <a:endParaRPr>
+              <a:hlinkClick r:id="rId4"/>
+            </a:endParaRPr>
           </a:p>
         </p:txBody>
       </p:sp>
       <p:sp>
         <p:nvSpPr>
           <p:cNvPr id="4" name="TextBox 3"/>
-          <p:cNvSpPr txBox="true"/>
+          <p:cNvSpPr txBox="1"/>
           <p:nvPr/>
         </p:nvSpPr>
         <p:spPr>
@@ -2682,11 +2838,130 @@
               </a:rPr>
               <a:t>Copyright © 2021 by Elephant Scale, All Rights Reserved</a:t>
             </a:r>
-            <a:endParaRPr sz="800">
-              <a:solidFill>
-                <a:srgbClr val="000000"/>
-              </a:solidFill>
-            </a:endParaRPr>
+          </a:p>
+        </p:txBody>
+      </p:sp>
+      <p:pic>
+        <p:nvPicPr>
+          <p:cNvPr id="5" name="Picture 4" descr="book-cover.png"/>
+          <p:cNvPicPr>
+            <a:picLocks noChangeAspect="1"/>
+          </p:cNvPicPr>
+          <p:nvPr/>
+        </p:nvPicPr>
+        <p:blipFill>
+          <a:blip r:embed="rId5"/>
+          <a:stretch>
+            <a:fillRect/>
+          </a:stretch>
+        </p:blipFill>
+        <p:spPr>
+          <a:xfrm>
+            <a:off x="704088" y="3692257"/>
+            <a:ext cx="2059838" cy="2834640"/>
+          </a:xfrm>
+          <a:prstGeom prst="rect">
+            <a:avLst/>
+          </a:prstGeom>
+        </p:spPr>
+      </p:pic>
+    </p:spTree>
+  </p:cSld>
+  <p:clrMapOvr>
+    <a:masterClrMapping/>
+  </p:clrMapOvr>
+</p:sld>
+</file>
+
+<file path=ppt/slides/slide13.xml><?xml version="1.0" encoding="utf-8"?>
+<p:sld xmlns:a="http://schemas.openxmlformats.org/drawingml/2006/main" xmlns:r="http://schemas.openxmlformats.org/officeDocument/2006/relationships" xmlns:p="http://schemas.openxmlformats.org/presentationml/2006/main">
+  <p:cSld>
+    <p:spTree>
+      <p:nvGrpSpPr>
+        <p:cNvPr id="1" name=""/>
+        <p:cNvGrpSpPr/>
+        <p:nvPr/>
+      </p:nvGrpSpPr>
+      <p:grpSpPr>
+        <a:xfrm>
+          <a:off x="0" y="0"/>
+          <a:ext cx="0" cy="0"/>
+          <a:chOff x="0" y="0"/>
+          <a:chExt cx="0" cy="0"/>
+        </a:xfrm>
+      </p:grpSpPr>
+      <p:sp>
+        <p:nvSpPr>
+          <p:cNvPr id="2" name="Title 1"/>
+          <p:cNvSpPr>
+            <a:spLocks noGrp="1"/>
+          </p:cNvSpPr>
+          <p:nvPr>
+            <p:ph type="title"/>
+          </p:nvPr>
+        </p:nvSpPr>
+        <p:spPr/>
+        <p:txBody>
+          <a:bodyPr/>
+          <a:lstStyle/>
+          <a:p>
+            <a:r>
+              <a:t>Questions?</a:t>
+            </a:r>
+          </a:p>
+        </p:txBody>
+      </p:sp>
+      <p:sp>
+        <p:nvSpPr>
+          <p:cNvPr id="3" name="Content Placeholder 2"/>
+          <p:cNvSpPr>
+            <a:spLocks noGrp="1"/>
+          </p:cNvSpPr>
+          <p:nvPr>
+            <p:ph idx="1"/>
+          </p:nvPr>
+        </p:nvSpPr>
+        <p:spPr/>
+        <p:txBody>
+          <a:bodyPr/>
+          <a:lstStyle/>
+          <a:p>
+            <a:r>
+              <a:t> Any questions?</a:t>
+            </a:r>
+          </a:p>
+        </p:txBody>
+      </p:sp>
+      <p:sp>
+        <p:nvSpPr>
+          <p:cNvPr id="4" name="TextBox 3"/>
+          <p:cNvSpPr txBox="1"/>
+          <p:nvPr/>
+        </p:nvSpPr>
+        <p:spPr>
+          <a:xfrm>
+            <a:off x="704088" y="8065008"/>
+            <a:ext cx="8915400" cy="228600"/>
+          </a:xfrm>
+          <a:prstGeom prst="rect">
+            <a:avLst/>
+          </a:prstGeom>
+          <a:noFill/>
+        </p:spPr>
+        <p:txBody>
+          <a:bodyPr wrap="none">
+            <a:spAutoFit/>
+          </a:bodyPr>
+          <a:lstStyle/>
+          <a:p>
+            <a:r>
+              <a:rPr sz="800">
+                <a:solidFill>
+                  <a:srgbClr val="000000"/>
+                </a:solidFill>
+              </a:rPr>
+              <a:t>Copyright © 2021 by Elephant Scale, All Rights Reserved</a:t>
+            </a:r>
           </a:p>
         </p:txBody>
       </p:sp>
@@ -2707,12 +2982,19 @@
         <p:cNvGrpSpPr/>
         <p:nvPr/>
       </p:nvGrpSpPr>
-      <p:grpSpPr/>
+      <p:grpSpPr>
+        <a:xfrm>
+          <a:off x="0" y="0"/>
+          <a:ext cx="0" cy="0"/>
+          <a:chOff x="0" y="0"/>
+          <a:chExt cx="0" cy="0"/>
+        </a:xfrm>
+      </p:grpSpPr>
       <p:sp>
         <p:nvSpPr>
           <p:cNvPr id="2" name="Title 1"/>
           <p:cNvSpPr>
-            <a:spLocks noGrp="true"/>
+            <a:spLocks noGrp="1"/>
           </p:cNvSpPr>
           <p:nvPr>
             <p:ph type="title"/>
@@ -2733,7 +3015,7 @@
         <p:nvSpPr>
           <p:cNvPr id="3" name="Content Placeholder 2"/>
           <p:cNvSpPr>
-            <a:spLocks noGrp="true"/>
+            <a:spLocks noGrp="1"/>
           </p:cNvSpPr>
           <p:nvPr>
             <p:ph idx="1"/>
@@ -2743,26 +3025,54 @@
         <p:txBody>
           <a:bodyPr/>
           <a:lstStyle/>
-          <a:p/>
-          <a:p/>
-          <a:p/>
-          <a:p/>
-          <a:p/>
-          <a:p/>
-          <a:p/>
-          <a:p/>
-          <a:p/>
-          <a:p/>
-          <a:p/>
-          <a:p/>
-          <a:p/>
-          <a:p/>
+          <a:p>
+            <a:endParaRPr/>
+          </a:p>
+          <a:p>
+            <a:endParaRPr/>
+          </a:p>
+          <a:p>
+            <a:endParaRPr/>
+          </a:p>
+          <a:p>
+            <a:endParaRPr/>
+          </a:p>
+          <a:p>
+            <a:endParaRPr/>
+          </a:p>
+          <a:p>
+            <a:endParaRPr/>
+          </a:p>
+          <a:p>
+            <a:endParaRPr/>
+          </a:p>
+          <a:p>
+            <a:endParaRPr/>
+          </a:p>
+          <a:p>
+            <a:endParaRPr/>
+          </a:p>
+          <a:p>
+            <a:endParaRPr/>
+          </a:p>
+          <a:p>
+            <a:endParaRPr/>
+          </a:p>
+          <a:p>
+            <a:endParaRPr/>
+          </a:p>
+          <a:p>
+            <a:endParaRPr/>
+          </a:p>
+          <a:p>
+            <a:endParaRPr/>
+          </a:p>
         </p:txBody>
       </p:sp>
       <p:sp>
         <p:nvSpPr>
           <p:cNvPr id="4" name="TextBox 3"/>
-          <p:cNvSpPr txBox="true"/>
+          <p:cNvSpPr txBox="1"/>
           <p:nvPr/>
         </p:nvSpPr>
         <p:spPr>
@@ -2789,11 +3099,6 @@
               </a:rPr>
               <a:t>Copyright © 2021 by Elephant Scale, All Rights Reserved</a:t>
             </a:r>
-            <a:endParaRPr sz="800">
-              <a:solidFill>
-                <a:srgbClr val="000000"/>
-              </a:solidFill>
-            </a:endParaRPr>
           </a:p>
         </p:txBody>
       </p:sp>
@@ -2801,7 +3106,7 @@
         <p:nvGraphicFramePr>
           <p:cNvPr id="5" name="Table 4"/>
           <p:cNvGraphicFramePr>
-            <a:graphicFrameLocks noGrp="true"/>
+            <a:graphicFrameLocks noGrp="1"/>
           </p:cNvGraphicFramePr>
           <p:nvPr/>
         </p:nvGraphicFramePr>
@@ -2812,12 +3117,24 @@
         <a:graphic>
           <a:graphicData uri="http://schemas.openxmlformats.org/drawingml/2006/table">
             <a:tbl>
-              <a:tblPr firstRow="true" bandRow="true">
+              <a:tblPr firstRow="1" bandRow="1">
                 <a:tableStyleId>{5C22544A-7EE6-4342-B048-85BDC9FD1C3A}</a:tableStyleId>
               </a:tblPr>
               <a:tblGrid>
-                <a:gridCol w="1342390"/>
-                <a:gridCol w="7573010"/>
+                <a:gridCol w="4457700">
+                  <a:extLst>
+                    <a:ext uri="{9D8B030D-6E8A-4147-A177-3AD203B41FA5}">
+                      <a16:colId xmlns:a16="http://schemas.microsoft.com/office/drawing/2014/main" val="20000"/>
+                    </a:ext>
+                  </a:extLst>
+                </a:gridCol>
+                <a:gridCol w="4457700">
+                  <a:extLst>
+                    <a:ext uri="{9D8B030D-6E8A-4147-A177-3AD203B41FA5}">
+                      <a16:colId xmlns:a16="http://schemas.microsoft.com/office/drawing/2014/main" val="20001"/>
+                    </a:ext>
+                  </a:extLst>
+                </a:gridCol>
               </a:tblGrid>
               <a:tr h="768096">
                 <a:tc>
@@ -2844,6 +3161,11 @@
                   </a:txBody>
                   <a:tcPr/>
                 </a:tc>
+                <a:extLst>
+                  <a:ext uri="{0D108BD9-81ED-4DB2-BD59-A6C34878D82A}">
+                    <a16:rowId xmlns:a16="http://schemas.microsoft.com/office/drawing/2014/main" val="10000"/>
+                  </a:ext>
+                </a:extLst>
               </a:tr>
               <a:tr h="768096">
                 <a:tc>
@@ -2870,6 +3192,11 @@
                   </a:txBody>
                   <a:tcPr/>
                 </a:tc>
+                <a:extLst>
+                  <a:ext uri="{0D108BD9-81ED-4DB2-BD59-A6C34878D82A}">
+                    <a16:rowId xmlns:a16="http://schemas.microsoft.com/office/drawing/2014/main" val="10001"/>
+                  </a:ext>
+                </a:extLst>
               </a:tr>
               <a:tr h="768096">
                 <a:tc>
@@ -2896,6 +3223,11 @@
                   </a:txBody>
                   <a:tcPr/>
                 </a:tc>
+                <a:extLst>
+                  <a:ext uri="{0D108BD9-81ED-4DB2-BD59-A6C34878D82A}">
+                    <a16:rowId xmlns:a16="http://schemas.microsoft.com/office/drawing/2014/main" val="10002"/>
+                  </a:ext>
+                </a:extLst>
               </a:tr>
               <a:tr h="768096">
                 <a:tc>
@@ -2922,6 +3254,11 @@
                   </a:txBody>
                   <a:tcPr/>
                 </a:tc>
+                <a:extLst>
+                  <a:ext uri="{0D108BD9-81ED-4DB2-BD59-A6C34878D82A}">
+                    <a16:rowId xmlns:a16="http://schemas.microsoft.com/office/drawing/2014/main" val="10003"/>
+                  </a:ext>
+                </a:extLst>
               </a:tr>
             </a:tbl>
           </a:graphicData>
@@ -2931,31 +3268,7 @@
         <p:nvPicPr>
           <p:cNvPr id="6" name="Picture 5" descr="vault.png"/>
           <p:cNvPicPr>
-            <a:picLocks noChangeAspect="true"/>
-          </p:cNvPicPr>
-          <p:nvPr/>
-        </p:nvPicPr>
-        <p:blipFill>
-          <a:blip r:embed="rId1"/>
-          <a:stretch>
-            <a:fillRect/>
-          </a:stretch>
-        </p:blipFill>
-        <p:spPr>
-          <a:xfrm>
-            <a:off x="704215" y="5439410"/>
-            <a:ext cx="1642745" cy="2135505"/>
-          </a:xfrm>
-          <a:prstGeom prst="rect">
-            <a:avLst/>
-          </a:prstGeom>
-        </p:spPr>
-      </p:pic>
-      <p:pic>
-        <p:nvPicPr>
-          <p:cNvPr id="7" name="Picture 6" descr="consul.jpeg"/>
-          <p:cNvPicPr>
-            <a:picLocks noChangeAspect="true"/>
+            <a:picLocks noChangeAspect="1"/>
           </p:cNvPicPr>
           <p:nvPr/>
         </p:nvPicPr>
@@ -2967,8 +3280,32 @@
         </p:blipFill>
         <p:spPr>
           <a:xfrm>
-            <a:off x="4585970" y="5545455"/>
-            <a:ext cx="4558030" cy="1923415"/>
+            <a:off x="704088" y="4797154"/>
+            <a:ext cx="2218929" cy="2883806"/>
+          </a:xfrm>
+          <a:prstGeom prst="rect">
+            <a:avLst/>
+          </a:prstGeom>
+        </p:spPr>
+      </p:pic>
+      <p:pic>
+        <p:nvPicPr>
+          <p:cNvPr id="7" name="Picture 6" descr="consul.jpeg"/>
+          <p:cNvPicPr>
+            <a:picLocks noChangeAspect="1"/>
+          </p:cNvPicPr>
+          <p:nvPr/>
+        </p:nvPicPr>
+        <p:blipFill>
+          <a:blip r:embed="rId3"/>
+          <a:stretch>
+            <a:fillRect/>
+          </a:stretch>
+        </p:blipFill>
+        <p:spPr>
+          <a:xfrm>
+            <a:off x="3675295" y="4935690"/>
+            <a:ext cx="4993217" cy="2106727"/>
           </a:xfrm>
           <a:prstGeom prst="rect">
             <a:avLst/>
@@ -2992,12 +3329,19 @@
         <p:cNvGrpSpPr/>
         <p:nvPr/>
       </p:nvGrpSpPr>
-      <p:grpSpPr/>
+      <p:grpSpPr>
+        <a:xfrm>
+          <a:off x="0" y="0"/>
+          <a:ext cx="0" cy="0"/>
+          <a:chOff x="0" y="0"/>
+          <a:chExt cx="0" cy="0"/>
+        </a:xfrm>
+      </p:grpSpPr>
       <p:sp>
         <p:nvSpPr>
           <p:cNvPr id="2" name="Title 1"/>
           <p:cNvSpPr>
-            <a:spLocks noGrp="true"/>
+            <a:spLocks noGrp="1"/>
           </p:cNvSpPr>
           <p:nvPr>
             <p:ph type="title"/>
@@ -3018,7 +3362,7 @@
         <p:nvSpPr>
           <p:cNvPr id="3" name="Content Placeholder 2"/>
           <p:cNvSpPr>
-            <a:spLocks noGrp="true"/>
+            <a:spLocks noGrp="1"/>
           </p:cNvSpPr>
           <p:nvPr>
             <p:ph idx="1"/>
@@ -3079,7 +3423,7 @@
       <p:sp>
         <p:nvSpPr>
           <p:cNvPr id="4" name="TextBox 3"/>
-          <p:cNvSpPr txBox="true"/>
+          <p:cNvSpPr txBox="1"/>
           <p:nvPr/>
         </p:nvSpPr>
         <p:spPr>
@@ -3106,11 +3450,6 @@
               </a:rPr>
               <a:t>Copyright © 2021 by Elephant Scale, All Rights Reserved</a:t>
             </a:r>
-            <a:endParaRPr sz="800">
-              <a:solidFill>
-                <a:srgbClr val="000000"/>
-              </a:solidFill>
-            </a:endParaRPr>
           </a:p>
         </p:txBody>
       </p:sp>
@@ -3131,12 +3470,19 @@
         <p:cNvGrpSpPr/>
         <p:nvPr/>
       </p:nvGrpSpPr>
-      <p:grpSpPr/>
+      <p:grpSpPr>
+        <a:xfrm>
+          <a:off x="0" y="0"/>
+          <a:ext cx="0" cy="0"/>
+          <a:chOff x="0" y="0"/>
+          <a:chExt cx="0" cy="0"/>
+        </a:xfrm>
+      </p:grpSpPr>
       <p:sp>
         <p:nvSpPr>
           <p:cNvPr id="2" name="Title 1"/>
           <p:cNvSpPr>
-            <a:spLocks noGrp="true"/>
+            <a:spLocks noGrp="1"/>
           </p:cNvSpPr>
           <p:nvPr>
             <p:ph type="title"/>
@@ -3157,7 +3503,7 @@
         <p:nvSpPr>
           <p:cNvPr id="3" name="Content Placeholder 2"/>
           <p:cNvSpPr>
-            <a:spLocks noGrp="true"/>
+            <a:spLocks noGrp="1"/>
           </p:cNvSpPr>
           <p:nvPr>
             <p:ph idx="1"/>
@@ -3197,7 +3543,7 @@
       <p:sp>
         <p:nvSpPr>
           <p:cNvPr id="4" name="TextBox 3"/>
-          <p:cNvSpPr txBox="true"/>
+          <p:cNvSpPr txBox="1"/>
           <p:nvPr/>
         </p:nvSpPr>
         <p:spPr>
@@ -3224,11 +3570,6 @@
               </a:rPr>
               <a:t>Copyright © 2021 by Elephant Scale, All Rights Reserved</a:t>
             </a:r>
-            <a:endParaRPr sz="800">
-              <a:solidFill>
-                <a:srgbClr val="000000"/>
-              </a:solidFill>
-            </a:endParaRPr>
           </a:p>
         </p:txBody>
       </p:sp>
@@ -3249,12 +3590,19 @@
         <p:cNvGrpSpPr/>
         <p:nvPr/>
       </p:nvGrpSpPr>
-      <p:grpSpPr/>
+      <p:grpSpPr>
+        <a:xfrm>
+          <a:off x="0" y="0"/>
+          <a:ext cx="0" cy="0"/>
+          <a:chOff x="0" y="0"/>
+          <a:chExt cx="0" cy="0"/>
+        </a:xfrm>
+      </p:grpSpPr>
       <p:sp>
         <p:nvSpPr>
           <p:cNvPr id="2" name="Title 1"/>
           <p:cNvSpPr>
-            <a:spLocks noGrp="true"/>
+            <a:spLocks noGrp="1"/>
           </p:cNvSpPr>
           <p:nvPr>
             <p:ph type="title"/>
@@ -3275,7 +3623,7 @@
         <p:nvSpPr>
           <p:cNvPr id="3" name="Content Placeholder 2"/>
           <p:cNvSpPr>
-            <a:spLocks noGrp="true"/>
+            <a:spLocks noGrp="1"/>
           </p:cNvSpPr>
           <p:nvPr>
             <p:ph idx="1"/>
@@ -3285,26 +3633,54 @@
         <p:txBody>
           <a:bodyPr/>
           <a:lstStyle/>
-          <a:p/>
-          <a:p/>
-          <a:p/>
-          <a:p/>
-          <a:p/>
-          <a:p/>
-          <a:p/>
-          <a:p/>
-          <a:p/>
-          <a:p/>
-          <a:p/>
-          <a:p/>
-          <a:p/>
-          <a:p/>
+          <a:p>
+            <a:endParaRPr/>
+          </a:p>
+          <a:p>
+            <a:endParaRPr/>
+          </a:p>
+          <a:p>
+            <a:endParaRPr/>
+          </a:p>
+          <a:p>
+            <a:endParaRPr/>
+          </a:p>
+          <a:p>
+            <a:endParaRPr/>
+          </a:p>
+          <a:p>
+            <a:endParaRPr/>
+          </a:p>
+          <a:p>
+            <a:endParaRPr/>
+          </a:p>
+          <a:p>
+            <a:endParaRPr/>
+          </a:p>
+          <a:p>
+            <a:endParaRPr/>
+          </a:p>
+          <a:p>
+            <a:endParaRPr/>
+          </a:p>
+          <a:p>
+            <a:endParaRPr/>
+          </a:p>
+          <a:p>
+            <a:endParaRPr/>
+          </a:p>
+          <a:p>
+            <a:endParaRPr/>
+          </a:p>
+          <a:p>
+            <a:endParaRPr/>
+          </a:p>
         </p:txBody>
       </p:sp>
       <p:sp>
         <p:nvSpPr>
           <p:cNvPr id="4" name="TextBox 3"/>
-          <p:cNvSpPr txBox="true"/>
+          <p:cNvSpPr txBox="1"/>
           <p:nvPr/>
         </p:nvSpPr>
         <p:spPr>
@@ -3331,11 +3707,6 @@
               </a:rPr>
               <a:t>Copyright © 2021 by Elephant Scale, All Rights Reserved</a:t>
             </a:r>
-            <a:endParaRPr sz="800">
-              <a:solidFill>
-                <a:srgbClr val="000000"/>
-              </a:solidFill>
-            </a:endParaRPr>
           </a:p>
         </p:txBody>
       </p:sp>
@@ -3343,12 +3714,12 @@
         <p:nvPicPr>
           <p:cNvPr id="5" name="Picture 4" descr="learn-to-fly.png"/>
           <p:cNvPicPr>
-            <a:picLocks noChangeAspect="true"/>
+            <a:picLocks noChangeAspect="1"/>
           </p:cNvPicPr>
           <p:nvPr/>
         </p:nvPicPr>
         <p:blipFill>
-          <a:blip r:embed="rId1"/>
+          <a:blip r:embed="rId2"/>
           <a:stretch>
             <a:fillRect/>
           </a:stretch>
@@ -3380,12 +3751,19 @@
         <p:cNvGrpSpPr/>
         <p:nvPr/>
       </p:nvGrpSpPr>
-      <p:grpSpPr/>
+      <p:grpSpPr>
+        <a:xfrm>
+          <a:off x="0" y="0"/>
+          <a:ext cx="0" cy="0"/>
+          <a:chOff x="0" y="0"/>
+          <a:chExt cx="0" cy="0"/>
+        </a:xfrm>
+      </p:grpSpPr>
       <p:sp>
         <p:nvSpPr>
           <p:cNvPr id="2" name="Title 1"/>
           <p:cNvSpPr>
-            <a:spLocks noGrp="true"/>
+            <a:spLocks noGrp="1"/>
           </p:cNvSpPr>
           <p:nvPr>
             <p:ph type="title"/>
@@ -3406,7 +3784,7 @@
         <p:nvSpPr>
           <p:cNvPr id="3" name="Content Placeholder 2"/>
           <p:cNvSpPr>
-            <a:spLocks noGrp="true"/>
+            <a:spLocks noGrp="1"/>
           </p:cNvSpPr>
           <p:nvPr>
             <p:ph idx="1"/>
@@ -3416,26 +3794,54 @@
         <p:txBody>
           <a:bodyPr/>
           <a:lstStyle/>
-          <a:p/>
-          <a:p/>
-          <a:p/>
-          <a:p/>
-          <a:p/>
-          <a:p/>
-          <a:p/>
-          <a:p/>
-          <a:p/>
-          <a:p/>
-          <a:p/>
-          <a:p/>
-          <a:p/>
-          <a:p/>
+          <a:p>
+            <a:endParaRPr/>
+          </a:p>
+          <a:p>
+            <a:endParaRPr/>
+          </a:p>
+          <a:p>
+            <a:endParaRPr/>
+          </a:p>
+          <a:p>
+            <a:endParaRPr/>
+          </a:p>
+          <a:p>
+            <a:endParaRPr/>
+          </a:p>
+          <a:p>
+            <a:endParaRPr/>
+          </a:p>
+          <a:p>
+            <a:endParaRPr/>
+          </a:p>
+          <a:p>
+            <a:endParaRPr/>
+          </a:p>
+          <a:p>
+            <a:endParaRPr/>
+          </a:p>
+          <a:p>
+            <a:endParaRPr/>
+          </a:p>
+          <a:p>
+            <a:endParaRPr/>
+          </a:p>
+          <a:p>
+            <a:endParaRPr/>
+          </a:p>
+          <a:p>
+            <a:endParaRPr/>
+          </a:p>
+          <a:p>
+            <a:endParaRPr/>
+          </a:p>
         </p:txBody>
       </p:sp>
       <p:sp>
         <p:nvSpPr>
           <p:cNvPr id="4" name="TextBox 3"/>
-          <p:cNvSpPr txBox="true"/>
+          <p:cNvSpPr txBox="1"/>
           <p:nvPr/>
         </p:nvSpPr>
         <p:spPr>
@@ -3462,11 +3868,6 @@
               </a:rPr>
               <a:t>Copyright © 2021 by Elephant Scale, All Rights Reserved</a:t>
             </a:r>
-            <a:endParaRPr sz="800">
-              <a:solidFill>
-                <a:srgbClr val="000000"/>
-              </a:solidFill>
-            </a:endParaRPr>
           </a:p>
         </p:txBody>
       </p:sp>
@@ -3474,12 +3875,12 @@
         <p:nvPicPr>
           <p:cNvPr id="5" name="Picture 4" descr="classroom-instruction.png"/>
           <p:cNvPicPr>
-            <a:picLocks noChangeAspect="true"/>
+            <a:picLocks noChangeAspect="1"/>
           </p:cNvPicPr>
           <p:nvPr/>
         </p:nvPicPr>
         <p:blipFill>
-          <a:blip r:embed="rId1"/>
+          <a:blip r:embed="rId2"/>
           <a:stretch>
             <a:fillRect/>
           </a:stretch>
@@ -3511,12 +3912,19 @@
         <p:cNvGrpSpPr/>
         <p:nvPr/>
       </p:nvGrpSpPr>
-      <p:grpSpPr/>
+      <p:grpSpPr>
+        <a:xfrm>
+          <a:off x="0" y="0"/>
+          <a:ext cx="0" cy="0"/>
+          <a:chOff x="0" y="0"/>
+          <a:chExt cx="0" cy="0"/>
+        </a:xfrm>
+      </p:grpSpPr>
       <p:sp>
         <p:nvSpPr>
           <p:cNvPr id="2" name="Title 1"/>
           <p:cNvSpPr>
-            <a:spLocks noGrp="true"/>
+            <a:spLocks noGrp="1"/>
           </p:cNvSpPr>
           <p:nvPr>
             <p:ph type="title"/>
@@ -3537,7 +3945,7 @@
         <p:nvSpPr>
           <p:cNvPr id="3" name="Content Placeholder 2"/>
           <p:cNvSpPr>
-            <a:spLocks noGrp="true"/>
+            <a:spLocks noGrp="1"/>
           </p:cNvSpPr>
           <p:nvPr>
             <p:ph idx="1"/>
@@ -3547,26 +3955,54 @@
         <p:txBody>
           <a:bodyPr/>
           <a:lstStyle/>
-          <a:p/>
-          <a:p/>
-          <a:p/>
-          <a:p/>
-          <a:p/>
-          <a:p/>
-          <a:p/>
-          <a:p/>
-          <a:p/>
-          <a:p/>
-          <a:p/>
-          <a:p/>
-          <a:p/>
-          <a:p/>
+          <a:p>
+            <a:endParaRPr/>
+          </a:p>
+          <a:p>
+            <a:endParaRPr/>
+          </a:p>
+          <a:p>
+            <a:endParaRPr/>
+          </a:p>
+          <a:p>
+            <a:endParaRPr/>
+          </a:p>
+          <a:p>
+            <a:endParaRPr/>
+          </a:p>
+          <a:p>
+            <a:endParaRPr/>
+          </a:p>
+          <a:p>
+            <a:endParaRPr/>
+          </a:p>
+          <a:p>
+            <a:endParaRPr/>
+          </a:p>
+          <a:p>
+            <a:endParaRPr/>
+          </a:p>
+          <a:p>
+            <a:endParaRPr/>
+          </a:p>
+          <a:p>
+            <a:endParaRPr/>
+          </a:p>
+          <a:p>
+            <a:endParaRPr/>
+          </a:p>
+          <a:p>
+            <a:endParaRPr/>
+          </a:p>
+          <a:p>
+            <a:endParaRPr/>
+          </a:p>
         </p:txBody>
       </p:sp>
       <p:sp>
         <p:nvSpPr>
           <p:cNvPr id="4" name="TextBox 3"/>
-          <p:cNvSpPr txBox="true"/>
+          <p:cNvSpPr txBox="1"/>
           <p:nvPr/>
         </p:nvSpPr>
         <p:spPr>
@@ -3593,11 +4029,6 @@
               </a:rPr>
               <a:t>Copyright © 2021 by Elephant Scale, All Rights Reserved</a:t>
             </a:r>
-            <a:endParaRPr sz="800">
-              <a:solidFill>
-                <a:srgbClr val="000000"/>
-              </a:solidFill>
-            </a:endParaRPr>
           </a:p>
         </p:txBody>
       </p:sp>
@@ -3605,12 +4036,12 @@
         <p:nvPicPr>
           <p:cNvPr id="5" name="Picture 4" descr="cockpit.png"/>
           <p:cNvPicPr>
-            <a:picLocks noChangeAspect="true"/>
+            <a:picLocks noChangeAspect="1"/>
           </p:cNvPicPr>
           <p:nvPr/>
         </p:nvPicPr>
         <p:blipFill>
-          <a:blip r:embed="rId1"/>
+          <a:blip r:embed="rId2"/>
           <a:stretch>
             <a:fillRect/>
           </a:stretch>
@@ -3642,12 +4073,19 @@
         <p:cNvGrpSpPr/>
         <p:nvPr/>
       </p:nvGrpSpPr>
-      <p:grpSpPr/>
+      <p:grpSpPr>
+        <a:xfrm>
+          <a:off x="0" y="0"/>
+          <a:ext cx="0" cy="0"/>
+          <a:chOff x="0" y="0"/>
+          <a:chExt cx="0" cy="0"/>
+        </a:xfrm>
+      </p:grpSpPr>
       <p:sp>
         <p:nvSpPr>
           <p:cNvPr id="2" name="Title 1"/>
           <p:cNvSpPr>
-            <a:spLocks noGrp="true"/>
+            <a:spLocks noGrp="1"/>
           </p:cNvSpPr>
           <p:nvPr>
             <p:ph type="title"/>
@@ -3668,7 +4106,7 @@
         <p:nvSpPr>
           <p:cNvPr id="3" name="Content Placeholder 2"/>
           <p:cNvSpPr>
-            <a:spLocks noGrp="true"/>
+            <a:spLocks noGrp="1"/>
           </p:cNvSpPr>
           <p:nvPr>
             <p:ph idx="1"/>
@@ -3678,20 +4116,36 @@
         <p:txBody>
           <a:bodyPr/>
           <a:lstStyle/>
-          <a:p/>
-          <a:p/>
-          <a:p/>
-          <a:p/>
-          <a:p/>
-          <a:p/>
-          <a:p/>
-          <a:p/>
+          <a:p>
+            <a:endParaRPr/>
+          </a:p>
+          <a:p>
+            <a:endParaRPr/>
+          </a:p>
+          <a:p>
+            <a:endParaRPr/>
+          </a:p>
+          <a:p>
+            <a:endParaRPr/>
+          </a:p>
+          <a:p>
+            <a:endParaRPr/>
+          </a:p>
+          <a:p>
+            <a:endParaRPr/>
+          </a:p>
+          <a:p>
+            <a:endParaRPr/>
+          </a:p>
+          <a:p>
+            <a:endParaRPr/>
+          </a:p>
         </p:txBody>
       </p:sp>
       <p:sp>
         <p:nvSpPr>
           <p:cNvPr id="4" name="TextBox 3"/>
-          <p:cNvSpPr txBox="true"/>
+          <p:cNvSpPr txBox="1"/>
           <p:nvPr/>
         </p:nvSpPr>
         <p:spPr>
@@ -3718,11 +4172,6 @@
               </a:rPr>
               <a:t>Copyright © 2021 by Elephant Scale, All Rights Reserved</a:t>
             </a:r>
-            <a:endParaRPr sz="800">
-              <a:solidFill>
-                <a:srgbClr val="000000"/>
-              </a:solidFill>
-            </a:endParaRPr>
           </a:p>
         </p:txBody>
       </p:sp>
@@ -3730,12 +4179,12 @@
         <p:nvPicPr>
           <p:cNvPr id="5" name="Picture 4" descr="Terraform-I-Know.png"/>
           <p:cNvPicPr>
-            <a:picLocks noChangeAspect="true"/>
+            <a:picLocks noChangeAspect="1"/>
           </p:cNvPicPr>
           <p:nvPr/>
         </p:nvPicPr>
         <p:blipFill>
-          <a:blip r:embed="rId1"/>
+          <a:blip r:embed="rId2"/>
           <a:stretch>
             <a:fillRect/>
           </a:stretch>
@@ -3767,12 +4216,19 @@
         <p:cNvGrpSpPr/>
         <p:nvPr/>
       </p:nvGrpSpPr>
-      <p:grpSpPr/>
+      <p:grpSpPr>
+        <a:xfrm>
+          <a:off x="0" y="0"/>
+          <a:ext cx="0" cy="0"/>
+          <a:chOff x="0" y="0"/>
+          <a:chExt cx="0" cy="0"/>
+        </a:xfrm>
+      </p:grpSpPr>
       <p:sp>
         <p:nvSpPr>
           <p:cNvPr id="2" name="Title 1"/>
           <p:cNvSpPr>
-            <a:spLocks noGrp="true"/>
+            <a:spLocks noGrp="1"/>
           </p:cNvSpPr>
           <p:nvPr>
             <p:ph type="title"/>
@@ -3793,7 +4249,7 @@
         <p:nvSpPr>
           <p:cNvPr id="3" name="Content Placeholder 2"/>
           <p:cNvSpPr>
-            <a:spLocks noGrp="true"/>
+            <a:spLocks noGrp="1"/>
           </p:cNvSpPr>
           <p:nvPr>
             <p:ph idx="1"/>
@@ -3843,13 +4299,15 @@
               <a:t> Something non-technical about you!(favorite ice cream flavor, hobby, etc.)</a:t>
             </a:r>
           </a:p>
-          <a:p/>
+          <a:p>
+            <a:endParaRPr/>
+          </a:p>
         </p:txBody>
       </p:sp>
       <p:sp>
         <p:nvSpPr>
           <p:cNvPr id="4" name="TextBox 3"/>
-          <p:cNvSpPr txBox="true"/>
+          <p:cNvSpPr txBox="1"/>
           <p:nvPr/>
         </p:nvSpPr>
         <p:spPr>
@@ -3876,11 +4334,6 @@
               </a:rPr>
               <a:t>Copyright © 2021 by Elephant Scale, All Rights Reserved</a:t>
             </a:r>
-            <a:endParaRPr sz="800">
-              <a:solidFill>
-                <a:srgbClr val="000000"/>
-              </a:solidFill>
-            </a:endParaRPr>
           </a:p>
         </p:txBody>
       </p:sp>
@@ -3888,12 +4341,12 @@
         <p:nvPicPr>
           <p:cNvPr id="5" name="Picture 4" descr="biking-1.jpg"/>
           <p:cNvPicPr>
-            <a:picLocks noChangeAspect="true"/>
+            <a:picLocks noChangeAspect="1"/>
           </p:cNvPicPr>
           <p:nvPr/>
         </p:nvPicPr>
         <p:blipFill>
-          <a:blip r:embed="rId1"/>
+          <a:blip r:embed="rId2"/>
           <a:stretch>
             <a:fillRect/>
           </a:stretch>
@@ -3912,12 +4365,12 @@
         <p:nvPicPr>
           <p:cNvPr id="6" name="Picture 5" descr="ice-cream-3.png"/>
           <p:cNvPicPr>
-            <a:picLocks noChangeAspect="true"/>
+            <a:picLocks noChangeAspect="1"/>
           </p:cNvPicPr>
           <p:nvPr/>
         </p:nvPicPr>
         <p:blipFill>
-          <a:blip r:embed="rId2"/>
+          <a:blip r:embed="rId3"/>
           <a:stretch>
             <a:fillRect/>
           </a:stretch>
@@ -3936,12 +4389,12 @@
         <p:nvPicPr>
           <p:cNvPr id="7" name="Picture 6" descr="biking-1.jpg"/>
           <p:cNvPicPr>
-            <a:picLocks noChangeAspect="true"/>
+            <a:picLocks noChangeAspect="1"/>
           </p:cNvPicPr>
           <p:nvPr/>
         </p:nvPicPr>
         <p:blipFill>
-          <a:blip r:embed="rId1"/>
+          <a:blip r:embed="rId2"/>
           <a:stretch>
             <a:fillRect/>
           </a:stretch>
@@ -4022,7 +4475,7 @@
         <a:solidFill>
           <a:schemeClr val="phClr"/>
         </a:solidFill>
-        <a:gradFill rotWithShape="true">
+        <a:gradFill rotWithShape="1">
           <a:gsLst>
             <a:gs pos="0">
               <a:schemeClr val="phClr">
@@ -4043,9 +4496,9 @@
               </a:schemeClr>
             </a:gs>
           </a:gsLst>
-          <a:lin ang="16200000" scaled="true"/>
+          <a:lin ang="16200000" scaled="1"/>
         </a:gradFill>
-        <a:gradFill rotWithShape="true">
+        <a:gradFill rotWithShape="1">
           <a:gsLst>
             <a:gs pos="0">
               <a:schemeClr val="phClr">
@@ -4062,7 +4515,7 @@
               </a:schemeClr>
             </a:gs>
           </a:gsLst>
-          <a:lin ang="16200000" scaled="false"/>
+          <a:lin ang="16200000" scaled="0"/>
         </a:gradFill>
       </a:fillStyleLst>
       <a:lnStyleLst>
@@ -4132,7 +4585,7 @@
         <a:solidFill>
           <a:schemeClr val="phClr"/>
         </a:solidFill>
-        <a:gradFill rotWithShape="true">
+        <a:gradFill rotWithShape="1">
           <a:gsLst>
             <a:gs pos="0">
               <a:schemeClr val="phClr">
@@ -4158,7 +4611,7 @@
             <a:fillToRect l="50000" t="-80000" r="50000" b="180000"/>
           </a:path>
         </a:gradFill>
-        <a:gradFill rotWithShape="true">
+        <a:gradFill rotWithShape="1">
           <a:gsLst>
             <a:gs pos="0">
               <a:schemeClr val="phClr">
@@ -4207,8 +4660,13 @@
           <a:headEnd type="none" w="med" len="med"/>
           <a:tailEnd type="none" w="med" len="med"/>
         </a:ln>
+        <a:effectLst/>
       </a:spPr>
-      <a:bodyPr vert="horz" wrap="square" lIns="91440" tIns="45720" rIns="91440" bIns="45720" numCol="1" anchor="t" anchorCtr="false" compatLnSpc="true"/>
+      <a:bodyPr vert="horz" wrap="square" lIns="91440" tIns="45720" rIns="91440" bIns="45720" numCol="1" anchor="t" anchorCtr="0" compatLnSpc="1">
+        <a:prstTxWarp prst="textNoShape">
+          <a:avLst/>
+        </a:prstTxWarp>
+      </a:bodyPr>
       <a:lstStyle>
         <a:defPPr marL="0" marR="0" indent="0" algn="ctr" defTabSz="914400" rtl="0" eaLnBrk="1" fontAlgn="base" latinLnBrk="0" hangingPunct="1">
           <a:lnSpc>
@@ -4224,6 +4682,7 @@
           <a:buSzTx/>
           <a:buFontTx/>
           <a:buNone/>
+          <a:tabLst/>
           <a:defRPr kumimoji="0" lang="en-US" sz="1000" b="0" i="0" u="none" strike="noStrike" cap="none" normalizeH="0" baseline="0">
             <a:ln>
               <a:noFill/>
@@ -4232,7 +4691,7 @@
               <a:schemeClr val="tx1"/>
             </a:solidFill>
             <a:effectLst/>
-            <a:latin typeface="Garamond" pitchFamily="18" charset="0"/>
+            <a:latin typeface="Garamond" pitchFamily="-110" charset="0"/>
           </a:defRPr>
         </a:defPPr>
       </a:lstStyle>
@@ -4263,8 +4722,13 @@
           <a:headEnd type="none" w="med" len="med"/>
           <a:tailEnd type="none" w="med" len="med"/>
         </a:ln>
+        <a:effectLst/>
       </a:spPr>
-      <a:bodyPr vert="horz" wrap="square" lIns="91440" tIns="45720" rIns="91440" bIns="45720" numCol="1" anchor="t" anchorCtr="false" compatLnSpc="true"/>
+      <a:bodyPr vert="horz" wrap="square" lIns="91440" tIns="45720" rIns="91440" bIns="45720" numCol="1" anchor="t" anchorCtr="0" compatLnSpc="1">
+        <a:prstTxWarp prst="textNoShape">
+          <a:avLst/>
+        </a:prstTxWarp>
+      </a:bodyPr>
       <a:lstStyle>
         <a:defPPr marL="0" marR="0" indent="0" algn="ctr" defTabSz="914400" rtl="0" eaLnBrk="1" fontAlgn="base" latinLnBrk="0" hangingPunct="1">
           <a:lnSpc>
@@ -4280,6 +4744,7 @@
           <a:buSzTx/>
           <a:buFontTx/>
           <a:buNone/>
+          <a:tabLst/>
           <a:defRPr kumimoji="0" lang="en-US" sz="1000" b="0" i="0" u="none" strike="noStrike" cap="none" normalizeH="0" baseline="0">
             <a:ln>
               <a:noFill/>
@@ -4288,7 +4753,7 @@
               <a:schemeClr val="tx1"/>
             </a:solidFill>
             <a:effectLst/>
-            <a:latin typeface="Garamond" pitchFamily="18" charset="0"/>
+            <a:latin typeface="Garamond" pitchFamily="-110" charset="0"/>
           </a:defRPr>
         </a:defPPr>
       </a:lstStyle>
@@ -4583,11 +5048,6 @@
       <a:clrMap bg1="dk2" tx1="lt1" bg2="dk1" tx2="lt2" accent1="accent1" accent2="accent2" accent3="accent3" accent4="accent4" accent5="accent5" accent6="accent6" hlink="hlink" folHlink="folHlink"/>
     </a:extraClrScheme>
   </a:extraClrSchemeLst>
-  <a:extLst>
-    <a:ext uri="{05A4C25C-085E-4340-85A3-A5531E510DB2}">
-      <thm15:themeFamily xmlns:thm15="http://schemas.microsoft.com/office/thememl/2012/main" name="Office Theme" id="{62F939B6-93AF-4DB8-9C6B-D6C7DFDC589F}" vid="{4A3C46E8-61CC-4603-A589-7422A47A8E4A}"/>
-    </a:ext>
-  </a:extLst>
 </a:theme>
 </file>
 
@@ -4707,7 +5167,7 @@
         <a:solidFill>
           <a:schemeClr val="phClr"/>
         </a:solidFill>
-        <a:gradFill rotWithShape="true">
+        <a:gradFill rotWithShape="1">
           <a:gsLst>
             <a:gs pos="0">
               <a:schemeClr val="phClr">
@@ -4728,9 +5188,9 @@
               </a:schemeClr>
             </a:gs>
           </a:gsLst>
-          <a:lin ang="16200000" scaled="true"/>
+          <a:lin ang="16200000" scaled="1"/>
         </a:gradFill>
-        <a:gradFill rotWithShape="true">
+        <a:gradFill rotWithShape="1">
           <a:gsLst>
             <a:gs pos="0">
               <a:schemeClr val="phClr">
@@ -4747,7 +5207,7 @@
               </a:schemeClr>
             </a:gs>
           </a:gsLst>
-          <a:lin ang="16200000" scaled="false"/>
+          <a:lin ang="16200000" scaled="0"/>
         </a:gradFill>
       </a:fillStyleLst>
       <a:lnStyleLst>
@@ -4817,7 +5277,7 @@
         <a:solidFill>
           <a:schemeClr val="phClr"/>
         </a:solidFill>
-        <a:gradFill rotWithShape="true">
+        <a:gradFill rotWithShape="1">
           <a:gsLst>
             <a:gs pos="0">
               <a:schemeClr val="phClr">
@@ -4843,7 +5303,7 @@
             <a:fillToRect l="50000" t="-80000" r="50000" b="180000"/>
           </a:path>
         </a:gradFill>
-        <a:gradFill rotWithShape="true">
+        <a:gradFill rotWithShape="1">
           <a:gsLst>
             <a:gs pos="0">
               <a:schemeClr val="phClr">
@@ -4905,11 +5365,7 @@
       </a:style>
     </a:lnDef>
   </a:objectDefaults>
-  <a:extLst>
-    <a:ext uri="{05A4C25C-085E-4340-85A3-A5531E510DB2}">
-      <thm15:themeFamily xmlns:thm15="http://schemas.microsoft.com/office/thememl/2012/main" name="Office Theme" id="{62F939B6-93AF-4DB8-9C6B-D6C7DFDC589F}" vid="{4A3C46E8-61CC-4603-A589-7422A47A8E4A}"/>
-    </a:ext>
-  </a:extLst>
+  <a:extraClrSchemeLst/>
 </a:theme>
 </file>
 
@@ -5029,7 +5485,7 @@
         <a:solidFill>
           <a:schemeClr val="phClr"/>
         </a:solidFill>
-        <a:gradFill rotWithShape="true">
+        <a:gradFill rotWithShape="1">
           <a:gsLst>
             <a:gs pos="0">
               <a:schemeClr val="phClr">
@@ -5050,9 +5506,9 @@
               </a:schemeClr>
             </a:gs>
           </a:gsLst>
-          <a:lin ang="16200000" scaled="true"/>
+          <a:lin ang="16200000" scaled="1"/>
         </a:gradFill>
-        <a:gradFill rotWithShape="true">
+        <a:gradFill rotWithShape="1">
           <a:gsLst>
             <a:gs pos="0">
               <a:schemeClr val="phClr">
@@ -5069,7 +5525,7 @@
               </a:schemeClr>
             </a:gs>
           </a:gsLst>
-          <a:lin ang="16200000" scaled="false"/>
+          <a:lin ang="16200000" scaled="0"/>
         </a:gradFill>
       </a:fillStyleLst>
       <a:lnStyleLst>
@@ -5139,7 +5595,7 @@
         <a:solidFill>
           <a:schemeClr val="phClr"/>
         </a:solidFill>
-        <a:gradFill rotWithShape="true">
+        <a:gradFill rotWithShape="1">
           <a:gsLst>
             <a:gs pos="0">
               <a:schemeClr val="phClr">
@@ -5165,7 +5621,7 @@
             <a:fillToRect l="50000" t="-80000" r="50000" b="180000"/>
           </a:path>
         </a:gradFill>
-        <a:gradFill rotWithShape="true">
+        <a:gradFill rotWithShape="1">
           <a:gsLst>
             <a:gs pos="0">
               <a:schemeClr val="phClr">
@@ -5227,10 +5683,6 @@
       </a:style>
     </a:lnDef>
   </a:objectDefaults>
-  <a:extLst>
-    <a:ext uri="{05A4C25C-085E-4340-85A3-A5531E510DB2}">
-      <thm15:themeFamily xmlns:thm15="http://schemas.microsoft.com/office/thememl/2012/main" name="Office Theme" id="{62F939B6-93AF-4DB8-9C6B-D6C7DFDC589F}" vid="{4A3C46E8-61CC-4603-A589-7422A47A8E4A}"/>
-    </a:ext>
-  </a:extLst>
+  <a:extraClrSchemeLst/>
 </a:theme>
 </file>
</xml_diff>